<commit_message>
removed severl unnecessary slides
</commit_message>
<xml_diff>
--- a/nsu_31_01_2017/31.01.2017_kutumov.pptx
+++ b/nsu_31_01_2017/31.01.2017_kutumov.pptx
@@ -6,10 +6,10 @@
     <p:sldMasterId id="2147483708" r:id="rId5"/>
   </p:sldMasterIdLst>
   <p:notesMasterIdLst>
-    <p:notesMasterId r:id="rId33"/>
+    <p:notesMasterId r:id="rId31"/>
   </p:notesMasterIdLst>
   <p:handoutMasterIdLst>
-    <p:handoutMasterId r:id="rId34"/>
+    <p:handoutMasterId r:id="rId32"/>
   </p:handoutMasterIdLst>
   <p:sldIdLst>
     <p:sldId id="256" r:id="rId6"/>
@@ -17,33 +17,31 @@
     <p:sldId id="292" r:id="rId8"/>
     <p:sldId id="323" r:id="rId9"/>
     <p:sldId id="328" r:id="rId10"/>
-    <p:sldId id="325" r:id="rId11"/>
-    <p:sldId id="330" r:id="rId12"/>
-    <p:sldId id="331" r:id="rId13"/>
-    <p:sldId id="336" r:id="rId14"/>
-    <p:sldId id="337" r:id="rId15"/>
-    <p:sldId id="338" r:id="rId16"/>
-    <p:sldId id="339" r:id="rId17"/>
-    <p:sldId id="340" r:id="rId18"/>
-    <p:sldId id="341" r:id="rId19"/>
-    <p:sldId id="335" r:id="rId20"/>
-    <p:sldId id="342" r:id="rId21"/>
-    <p:sldId id="343" r:id="rId22"/>
-    <p:sldId id="345" r:id="rId23"/>
-    <p:sldId id="346" r:id="rId24"/>
-    <p:sldId id="352" r:id="rId25"/>
-    <p:sldId id="350" r:id="rId26"/>
-    <p:sldId id="267" r:id="rId27"/>
-    <p:sldId id="353" r:id="rId28"/>
-    <p:sldId id="347" r:id="rId29"/>
-    <p:sldId id="349" r:id="rId30"/>
-    <p:sldId id="348" r:id="rId31"/>
-    <p:sldId id="351" r:id="rId32"/>
+    <p:sldId id="331" r:id="rId11"/>
+    <p:sldId id="336" r:id="rId12"/>
+    <p:sldId id="337" r:id="rId13"/>
+    <p:sldId id="338" r:id="rId14"/>
+    <p:sldId id="339" r:id="rId15"/>
+    <p:sldId id="340" r:id="rId16"/>
+    <p:sldId id="341" r:id="rId17"/>
+    <p:sldId id="335" r:id="rId18"/>
+    <p:sldId id="342" r:id="rId19"/>
+    <p:sldId id="343" r:id="rId20"/>
+    <p:sldId id="345" r:id="rId21"/>
+    <p:sldId id="346" r:id="rId22"/>
+    <p:sldId id="352" r:id="rId23"/>
+    <p:sldId id="350" r:id="rId24"/>
+    <p:sldId id="267" r:id="rId25"/>
+    <p:sldId id="353" r:id="rId26"/>
+    <p:sldId id="347" r:id="rId27"/>
+    <p:sldId id="349" r:id="rId28"/>
+    <p:sldId id="348" r:id="rId29"/>
+    <p:sldId id="351" r:id="rId30"/>
   </p:sldIdLst>
   <p:sldSz cx="9144000" cy="5143500" type="screen16x9"/>
   <p:notesSz cx="6669088" cy="9926638"/>
   <p:custDataLst>
-    <p:tags r:id="rId35"/>
+    <p:tags r:id="rId33"/>
   </p:custDataLst>
   <p:defaultTextStyle>
     <a:defPPr>
@@ -915,42 +913,66 @@
           <a:p>
             <a:r>
               <a:rPr lang="en-US" baseline="0" dirty="0" smtClean="0"/>
-              <a:t>Tampering</a:t>
+              <a:t>Information disclosure – </a:t>
             </a:r>
             <a:r>
               <a:rPr lang="ru-RU" baseline="0" dirty="0" smtClean="0"/>
-              <a:t> – процесс подмены данных, или же процесс подмены исполняемого файла.</a:t>
+              <a:t>это несанкционированное раскрытие данных.</a:t>
             </a:r>
           </a:p>
           <a:p>
             <a:endParaRPr lang="ru-RU" baseline="0" dirty="0" smtClean="0"/>
           </a:p>
           <a:p>
+            <a:endParaRPr lang="ru-RU" baseline="0" dirty="0" smtClean="0"/>
+          </a:p>
+          <a:p>
             <a:r>
               <a:rPr lang="ru-RU" baseline="0" dirty="0" smtClean="0"/>
-              <a:t>В качестве примера </a:t>
+              <a:t>Тут можно придумать несколько примеров:</a:t>
+            </a:r>
+          </a:p>
+          <a:p>
+            <a:endParaRPr lang="ru-RU" baseline="0" dirty="0" smtClean="0"/>
+          </a:p>
+          <a:p>
+            <a:r>
+              <a:rPr lang="ru-RU" baseline="0" dirty="0" smtClean="0"/>
+              <a:t>Например, вы передаете секретную информацию в открытом виде по незащищенному каналу – например </a:t>
             </a:r>
             <a:r>
               <a:rPr lang="en-US" baseline="0" dirty="0" smtClean="0"/>
-              <a:t>tampering</a:t>
+              <a:t>http.</a:t>
             </a:r>
             <a:r>
               <a:rPr lang="ru-RU" baseline="0" dirty="0" smtClean="0"/>
-              <a:t> можно рассмотреть </a:t>
+              <a:t> В этом случае злоумышленник с помощью обычного </a:t>
+            </a:r>
+            <a:r>
+              <a:rPr lang="ru-RU" baseline="0" dirty="0" err="1" smtClean="0"/>
+              <a:t>снифера</a:t>
             </a:r>
             <a:r>
               <a:rPr lang="ru-RU" baseline="0" dirty="0" smtClean="0"/>
-              <a:t>опять–же </a:t>
-            </a:r>
+              <a:t> пакетов может получить всю вашу информацию.</a:t>
+            </a:r>
+          </a:p>
+          <a:p>
+            <a:endParaRPr lang="ru-RU" baseline="0" dirty="0" smtClean="0"/>
+          </a:p>
+          <a:p>
             <a:r>
               <a:rPr lang="ru-RU" baseline="0" dirty="0" smtClean="0"/>
-              <a:t>электронную почту.</a:t>
-            </a:r>
+              <a:t>Какие еще есть варианты несанкционированного раскрытия информации?</a:t>
+            </a:r>
+          </a:p>
+          <a:p>
+            <a:endParaRPr lang="ru-RU" baseline="0" dirty="0" smtClean="0"/>
           </a:p>
           <a:p>
             <a:r>
               <a:rPr lang="ru-RU" baseline="0" dirty="0" smtClean="0"/>
-              <a:t>Злоумышленник может перехватить ваше письмо, поменять его содержимое и вы об этом никак не узнаете.</a:t>
+              <a:t>Например, отладочная печать. Программист для целей отладки включил печать логина и пароля на экран.</a:t>
             </a:r>
           </a:p>
           <a:p>
@@ -959,33 +981,15 @@
           <a:p>
             <a:r>
               <a:rPr lang="ru-RU" baseline="0" dirty="0" smtClean="0"/>
-              <a:t>Что важно, </a:t>
-            </a:r>
-            <a:r>
-              <a:rPr lang="en-US" baseline="0" dirty="0" smtClean="0"/>
-              <a:t>tampering</a:t>
-            </a:r>
-            <a:r>
-              <a:rPr lang="ru-RU" baseline="0" dirty="0" smtClean="0"/>
-              <a:t>-у подвержены не только данные, но и исполняемые модули:</a:t>
-            </a:r>
+              <a:t>Вот вам и угроза.</a:t>
+            </a:r>
+            <a:endParaRPr lang="en-US" baseline="0" dirty="0" smtClean="0"/>
+          </a:p>
+          <a:p>
+            <a:endParaRPr lang="en-US" baseline="0" dirty="0" smtClean="0"/>
           </a:p>
           <a:p>
             <a:endParaRPr lang="ru-RU" baseline="0" dirty="0" smtClean="0"/>
-          </a:p>
-          <a:p>
-            <a:r>
-              <a:rPr lang="ru-RU" baseline="0" dirty="0" smtClean="0"/>
-              <a:t>Например, злоумышленник может подменить приложение, </a:t>
-            </a:r>
-            <a:r>
-              <a:rPr lang="en-US" baseline="0" dirty="0" smtClean="0"/>
-              <a:t>DLL</a:t>
-            </a:r>
-            <a:r>
-              <a:rPr lang="ru-RU" baseline="0" dirty="0" smtClean="0"/>
-              <a:t>, скрипт на свой, и если у вашей системы нет проверки целостности, то вы об этом никак не узнаете и запустите зловредное приложение.</a:t>
-            </a:r>
           </a:p>
         </p:txBody>
       </p:sp>
@@ -1016,7 +1020,7 @@
     </p:spTree>
     <p:extLst>
       <p:ext uri="{BB962C8B-B14F-4D97-AF65-F5344CB8AC3E}">
-        <p14:creationId xmlns:p14="http://schemas.microsoft.com/office/powerpoint/2010/main" val="722600875"/>
+        <p14:creationId xmlns:p14="http://schemas.microsoft.com/office/powerpoint/2010/main" val="2529652527"/>
       </p:ext>
     </p:extLst>
   </p:cSld>
@@ -1071,12 +1075,33 @@
           <a:lstStyle/>
           <a:p>
             <a:r>
+              <a:rPr lang="ru-RU" baseline="0" dirty="0" smtClean="0"/>
+              <a:t>Вариант «отказ в обслуживании» наверное, самый простой.</a:t>
+            </a:r>
+          </a:p>
+          <a:p>
+            <a:endParaRPr lang="ru-RU" baseline="0" dirty="0" smtClean="0"/>
+          </a:p>
+          <a:p>
+            <a:r>
+              <a:rPr lang="ru-RU" baseline="0" dirty="0" smtClean="0"/>
+              <a:t>Все наверняка слышали о </a:t>
+            </a:r>
+            <a:r>
+              <a:rPr lang="en-US" baseline="0" dirty="0" err="1" smtClean="0"/>
+              <a:t>DoS</a:t>
+            </a:r>
+            <a:r>
+              <a:rPr lang="ru-RU" baseline="0" dirty="0" smtClean="0"/>
+              <a:t> атаках и </a:t>
+            </a:r>
+            <a:r>
               <a:rPr lang="en-US" baseline="0" dirty="0" smtClean="0"/>
-              <a:t>Repudiation – </a:t>
+              <a:t>DDoS</a:t>
             </a:r>
             <a:r>
               <a:rPr lang="ru-RU" baseline="0" dirty="0" smtClean="0"/>
-              <a:t>это процесс заметания следов.</a:t>
+              <a:t> атаках, когда с помощью огромного числа компьютеров организуют одновременные запросы к серверу. Сервер не выдерживает такой нагрузки и падает. При этом легитимные пользователи не могут получить доступ к сервису.</a:t>
             </a:r>
           </a:p>
           <a:p>
@@ -1085,56 +1110,16 @@
           <a:p>
             <a:r>
               <a:rPr lang="ru-RU" baseline="0" dirty="0" smtClean="0"/>
-              <a:t>Например, если данные пользователя были скомпрометированы – например, все знают логин/пароль для входа в какую-нибудь систему.</a:t>
-            </a:r>
+              <a:t>Что еще может быть причиной отказа в обслуживании.</a:t>
+            </a:r>
+          </a:p>
+          <a:p>
+            <a:endParaRPr lang="ru-RU" baseline="0" dirty="0" smtClean="0"/>
           </a:p>
           <a:p>
             <a:r>
               <a:rPr lang="ru-RU" baseline="0" dirty="0" smtClean="0"/>
-              <a:t>В этом случае, если </a:t>
-            </a:r>
-            <a:r>
-              <a:rPr lang="ru-RU" baseline="0" dirty="0" err="1" smtClean="0"/>
-              <a:t>злоумышленик</a:t>
-            </a:r>
-            <a:r>
-              <a:rPr lang="ru-RU" baseline="0" dirty="0" smtClean="0"/>
-              <a:t> завладеет такими данными, то он сможет выполнить несанкционированные действия, и никто не сможет выяснить, кто же на самом деле осуществил эти действия.</a:t>
-            </a:r>
-          </a:p>
-          <a:p>
-            <a:endParaRPr lang="ru-RU" baseline="0" dirty="0" smtClean="0"/>
-          </a:p>
-          <a:p>
-            <a:endParaRPr lang="ru-RU" baseline="0" dirty="0" smtClean="0"/>
-          </a:p>
-          <a:p>
-            <a:r>
-              <a:rPr lang="ru-RU" baseline="0" dirty="0" smtClean="0"/>
-              <a:t>Кто может еще привести пример </a:t>
-            </a:r>
-            <a:r>
-              <a:rPr lang="en-US" baseline="0" dirty="0" smtClean="0"/>
-              <a:t>repudiation</a:t>
-            </a:r>
-            <a:r>
-              <a:rPr lang="ru-RU" baseline="0" dirty="0" smtClean="0"/>
-              <a:t> – например, у нас есть система, которая фиксирует количество неуспешных попыток логина.</a:t>
-            </a:r>
-          </a:p>
-          <a:p>
-            <a:r>
-              <a:rPr lang="ru-RU" baseline="0" dirty="0" smtClean="0"/>
-              <a:t>Если данная информация (о неуспешных попытках логина) не защищена должным образом, то злоумышленник может удалить всю информацию о неуспешных попытках логина.</a:t>
-            </a:r>
-          </a:p>
-          <a:p>
-            <a:endParaRPr lang="ru-RU" baseline="0" dirty="0" smtClean="0"/>
-          </a:p>
-          <a:p>
-            <a:r>
-              <a:rPr lang="ru-RU" baseline="0" dirty="0" smtClean="0"/>
-              <a:t>Заметьте, при этом злоумышленник может и не получить доступ к системе, однако информация о неуспешном логине исчезнет.</a:t>
+              <a:t>Например, мы можем испортить конфигурационный файл программы, из за этого программа не сможет запуститься.</a:t>
             </a:r>
           </a:p>
         </p:txBody>
@@ -1166,7 +1151,7 @@
     </p:spTree>
     <p:extLst>
       <p:ext uri="{BB962C8B-B14F-4D97-AF65-F5344CB8AC3E}">
-        <p14:creationId xmlns:p14="http://schemas.microsoft.com/office/powerpoint/2010/main" val="30538106"/>
+        <p14:creationId xmlns:p14="http://schemas.microsoft.com/office/powerpoint/2010/main" val="2193844591"/>
       </p:ext>
     </p:extLst>
   </p:cSld>
@@ -1221,89 +1206,70 @@
           <a:lstStyle/>
           <a:p>
             <a:r>
+              <a:rPr lang="ru-RU" baseline="0" dirty="0" smtClean="0"/>
+              <a:t>Несанкционированное получение привилегий.</a:t>
+            </a:r>
+          </a:p>
+          <a:p>
+            <a:endParaRPr lang="ru-RU" baseline="0" dirty="0" smtClean="0"/>
+          </a:p>
+          <a:p>
+            <a:r>
+              <a:rPr lang="ru-RU" baseline="0" dirty="0" smtClean="0"/>
+              <a:t>Например, у нас есть система, в которой есть два пользователя: </a:t>
+            </a:r>
+            <a:r>
               <a:rPr lang="en-US" baseline="0" dirty="0" smtClean="0"/>
-              <a:t>Information disclosure – </a:t>
+              <a:t>user</a:t>
             </a:r>
             <a:r>
               <a:rPr lang="ru-RU" baseline="0" dirty="0" smtClean="0"/>
-              <a:t>это несанкционированное раскрытие данных.</a:t>
+              <a:t> и </a:t>
+            </a:r>
+            <a:r>
+              <a:rPr lang="en-US" baseline="0" dirty="0" smtClean="0"/>
+              <a:t>admin</a:t>
+            </a:r>
+            <a:r>
+              <a:rPr lang="ru-RU" baseline="0" dirty="0" smtClean="0"/>
+              <a:t>. Причем пользователь </a:t>
+            </a:r>
+            <a:r>
+              <a:rPr lang="en-US" baseline="0" dirty="0" smtClean="0"/>
+              <a:t>admin</a:t>
+            </a:r>
+            <a:r>
+              <a:rPr lang="ru-RU" baseline="0" dirty="0" smtClean="0"/>
+              <a:t> обладает более мощными привилегиями, чем</a:t>
+            </a:r>
+            <a:r>
+              <a:rPr lang="en-US" baseline="0" dirty="0" smtClean="0"/>
+              <a:t> user</a:t>
+            </a:r>
+            <a:r>
+              <a:rPr lang="ru-RU" baseline="0" dirty="0" smtClean="0"/>
+              <a:t>.</a:t>
             </a:r>
           </a:p>
           <a:p>
             <a:endParaRPr lang="ru-RU" baseline="0" dirty="0" smtClean="0"/>
           </a:p>
           <a:p>
+            <a:r>
+              <a:rPr lang="ru-RU" baseline="0" dirty="0" smtClean="0"/>
+              <a:t>Злоумышленник обладая только логином и паролем </a:t>
+            </a:r>
+            <a:r>
+              <a:rPr lang="en-US" baseline="0" dirty="0" smtClean="0"/>
+              <a:t>user</a:t>
+            </a:r>
+            <a:r>
+              <a:rPr lang="ru-RU" baseline="0" dirty="0" smtClean="0"/>
+              <a:t> может совершать действия, которые доступны только администратору.</a:t>
+            </a:r>
+          </a:p>
+          <a:p>
             <a:endParaRPr lang="ru-RU" baseline="0" dirty="0" smtClean="0"/>
-          </a:p>
-          <a:p>
-            <a:r>
-              <a:rPr lang="ru-RU" baseline="0" dirty="0" smtClean="0"/>
-              <a:t>Тут можно придумать несколько примеров:</a:t>
-            </a:r>
-          </a:p>
-          <a:p>
-            <a:endParaRPr lang="ru-RU" baseline="0" dirty="0" smtClean="0"/>
-          </a:p>
-          <a:p>
-            <a:r>
-              <a:rPr lang="ru-RU" baseline="0" dirty="0" smtClean="0"/>
-              <a:t>Например, вы передаете секретную </a:t>
-            </a:r>
-            <a:r>
-              <a:rPr lang="ru-RU" baseline="0" dirty="0" smtClean="0"/>
-              <a:t>информацию в открытом виде </a:t>
-            </a:r>
-            <a:r>
-              <a:rPr lang="ru-RU" baseline="0" dirty="0" smtClean="0"/>
-              <a:t>по незащищенному каналу – например </a:t>
-            </a:r>
-            <a:r>
-              <a:rPr lang="en-US" baseline="0" dirty="0" smtClean="0"/>
-              <a:t>http.</a:t>
-            </a:r>
-            <a:r>
-              <a:rPr lang="ru-RU" baseline="0" dirty="0" smtClean="0"/>
-              <a:t> В этом случае злоумышленник с помощью обычного </a:t>
-            </a:r>
-            <a:r>
-              <a:rPr lang="ru-RU" baseline="0" dirty="0" err="1" smtClean="0"/>
-              <a:t>снифера</a:t>
-            </a:r>
-            <a:r>
-              <a:rPr lang="ru-RU" baseline="0" dirty="0" smtClean="0"/>
-              <a:t> пакетов может получить всю вашу информацию.</a:t>
-            </a:r>
-          </a:p>
-          <a:p>
-            <a:endParaRPr lang="ru-RU" baseline="0" dirty="0" smtClean="0"/>
-          </a:p>
-          <a:p>
-            <a:r>
-              <a:rPr lang="ru-RU" baseline="0" dirty="0" smtClean="0"/>
-              <a:t>Какие еще есть варианты несанкционированного раскрытия информации?</a:t>
-            </a:r>
-          </a:p>
-          <a:p>
-            <a:endParaRPr lang="ru-RU" baseline="0" dirty="0" smtClean="0"/>
-          </a:p>
-          <a:p>
-            <a:r>
-              <a:rPr lang="ru-RU" baseline="0" dirty="0" smtClean="0"/>
-              <a:t>Например, отладочная печать. Программист для целей отладки включил печать логина и пароля на экран.</a:t>
-            </a:r>
-          </a:p>
-          <a:p>
-            <a:endParaRPr lang="ru-RU" baseline="0" dirty="0" smtClean="0"/>
-          </a:p>
-          <a:p>
-            <a:r>
-              <a:rPr lang="ru-RU" baseline="0" dirty="0" smtClean="0"/>
-              <a:t>Вот вам и угроза.</a:t>
-            </a:r>
-            <a:endParaRPr lang="en-US" baseline="0" dirty="0" smtClean="0"/>
-          </a:p>
-          <a:p>
-            <a:endParaRPr lang="en-US" baseline="0" dirty="0" smtClean="0"/>
           </a:p>
           <a:p>
             <a:endParaRPr lang="ru-RU" baseline="0" dirty="0" smtClean="0"/>
@@ -1337,7 +1303,7 @@
     </p:spTree>
     <p:extLst>
       <p:ext uri="{BB962C8B-B14F-4D97-AF65-F5344CB8AC3E}">
-        <p14:creationId xmlns:p14="http://schemas.microsoft.com/office/powerpoint/2010/main" val="2529652527"/>
+        <p14:creationId xmlns:p14="http://schemas.microsoft.com/office/powerpoint/2010/main" val="1348462960"/>
       </p:ext>
     </p:extLst>
   </p:cSld>
@@ -1393,32 +1359,58 @@
           <a:p>
             <a:r>
               <a:rPr lang="ru-RU" baseline="0" dirty="0" smtClean="0"/>
-              <a:t>Вариант «отказ в обслуживании» наверное, самый простой.</a:t>
+              <a:t>Теперь, что такое моделирование угроз?</a:t>
+            </a:r>
+            <a:endParaRPr lang="en-US" baseline="0" dirty="0" smtClean="0"/>
+          </a:p>
+          <a:p>
+            <a:endParaRPr lang="en-US" baseline="0" dirty="0" smtClean="0"/>
+          </a:p>
+          <a:p>
+            <a:r>
+              <a:rPr lang="ru-RU" baseline="0" dirty="0" smtClean="0"/>
+              <a:t>Опять нам на помощь приходит чек-лист из 3-х пунктов.</a:t>
             </a:r>
           </a:p>
           <a:p>
             <a:endParaRPr lang="ru-RU" baseline="0" dirty="0" smtClean="0"/>
           </a:p>
           <a:p>
+            <a:pPr marL="0" indent="0">
+              <a:buNone/>
+            </a:pPr>
             <a:r>
               <a:rPr lang="ru-RU" baseline="0" dirty="0" smtClean="0"/>
-              <a:t>Все наверняка слышали о </a:t>
-            </a:r>
-            <a:r>
-              <a:rPr lang="en-US" baseline="0" dirty="0" err="1" smtClean="0"/>
-              <a:t>DoS</a:t>
-            </a:r>
+              <a:t>Чтобы понимать, что угрожает нашей программе, мы должны идентифицировать угрозу. </a:t>
+            </a:r>
+          </a:p>
+          <a:p>
+            <a:pPr marL="0" indent="0">
+              <a:buNone/>
+            </a:pPr>
             <a:r>
               <a:rPr lang="ru-RU" baseline="0" dirty="0" smtClean="0"/>
-              <a:t> атаках и </a:t>
+              <a:t>Что это значит? Это значит, что мы должны сопоставить этой угрозе одно из значений из списка </a:t>
             </a:r>
             <a:r>
               <a:rPr lang="en-US" baseline="0" dirty="0" smtClean="0"/>
-              <a:t>DDoS</a:t>
-            </a:r>
+              <a:t>STRIDE.</a:t>
+            </a:r>
+            <a:endParaRPr lang="ru-RU" baseline="0" dirty="0" smtClean="0"/>
+          </a:p>
+          <a:p>
+            <a:pPr marL="0" indent="0">
+              <a:buNone/>
+            </a:pPr>
+            <a:endParaRPr lang="ru-RU" baseline="0" dirty="0" smtClean="0"/>
+          </a:p>
+          <a:p>
+            <a:endParaRPr lang="ru-RU" baseline="0" dirty="0" smtClean="0"/>
+          </a:p>
+          <a:p>
             <a:r>
               <a:rPr lang="ru-RU" baseline="0" dirty="0" smtClean="0"/>
-              <a:t> атаках, когда с помощью огромного числа компьютеров организуют одновременные запросы к серверу. Сервер не выдерживает такой нагрузки и падает. При этом легитимные пользователи не могут получить доступ к сервису.</a:t>
+              <a:t>После этого мы должны все угрозы составить в список, чтобы он был перед глазами.</a:t>
             </a:r>
           </a:p>
           <a:p>
@@ -1427,17 +1419,20 @@
           <a:p>
             <a:r>
               <a:rPr lang="ru-RU" baseline="0" dirty="0" smtClean="0"/>
-              <a:t>Что еще может быть причиной отказа в обслуживании.</a:t>
-            </a:r>
+              <a:t>И в конце мы должны эти угрозы </a:t>
+            </a:r>
+            <a:r>
+              <a:rPr lang="ru-RU" baseline="0" dirty="0" err="1" smtClean="0"/>
+              <a:t>приоритезировать</a:t>
+            </a:r>
+            <a:r>
+              <a:rPr lang="ru-RU" baseline="0" dirty="0" smtClean="0"/>
+              <a:t>. Этот пункт очень важный и очень сложный. Важно понимать, какие угрозы наиболее реальны, какие нет. Какие угрозы несут большой вред системе, какие нет. В общем нужно угрозы переупорядочить, и работать с ними начиная с самой важной.</a:t>
+            </a:r>
+            <a:endParaRPr lang="en-US" baseline="0" dirty="0" smtClean="0"/>
           </a:p>
           <a:p>
             <a:endParaRPr lang="ru-RU" baseline="0" dirty="0" smtClean="0"/>
-          </a:p>
-          <a:p>
-            <a:r>
-              <a:rPr lang="ru-RU" baseline="0" dirty="0" smtClean="0"/>
-              <a:t>Например, мы можем испортить конфигурационный файл программы, из за этого программа не сможет запуститься.</a:t>
-            </a:r>
           </a:p>
         </p:txBody>
       </p:sp>
@@ -1468,7 +1463,7 @@
     </p:spTree>
     <p:extLst>
       <p:ext uri="{BB962C8B-B14F-4D97-AF65-F5344CB8AC3E}">
-        <p14:creationId xmlns:p14="http://schemas.microsoft.com/office/powerpoint/2010/main" val="2193844591"/>
+        <p14:creationId xmlns:p14="http://schemas.microsoft.com/office/powerpoint/2010/main" val="2081521291"/>
       </p:ext>
     </p:extLst>
   </p:cSld>
@@ -1524,7 +1519,7 @@
           <a:p>
             <a:r>
               <a:rPr lang="ru-RU" baseline="0" dirty="0" smtClean="0"/>
-              <a:t>Несанкционированное получение привилегий.</a:t>
+              <a:t>Давайте вернемся к пункту 1 – идентификация угроз.</a:t>
             </a:r>
           </a:p>
           <a:p>
@@ -1533,63 +1528,47 @@
           <a:p>
             <a:r>
               <a:rPr lang="ru-RU" baseline="0" dirty="0" smtClean="0"/>
-              <a:t>Например, у нас есть система, в которой есть два пользователя: </a:t>
+              <a:t>Как мы это будем делать?</a:t>
+            </a:r>
+          </a:p>
+          <a:p>
+            <a:r>
+              <a:rPr lang="ru-RU" baseline="0" dirty="0" smtClean="0"/>
+              <a:t>Можно с наскоку навалиться на весь проект. Но такой подход вряд ли нам поможет при моделировании угроз в более-менее серьезном проекте.</a:t>
+            </a:r>
+          </a:p>
+          <a:p>
+            <a:endParaRPr lang="ru-RU" baseline="0" dirty="0" smtClean="0"/>
+          </a:p>
+          <a:p>
+            <a:r>
+              <a:rPr lang="ru-RU" baseline="0" dirty="0" smtClean="0"/>
+              <a:t>Опять же, есть формальный подход к идентификации и поиску всех угроз – это </a:t>
             </a:r>
             <a:r>
               <a:rPr lang="en-US" baseline="0" dirty="0" smtClean="0"/>
-              <a:t>user</a:t>
+              <a:t>Data Flow </a:t>
             </a:r>
             <a:r>
               <a:rPr lang="ru-RU" baseline="0" dirty="0" smtClean="0"/>
-              <a:t> и </a:t>
+              <a:t>Диаграммы</a:t>
             </a:r>
             <a:r>
               <a:rPr lang="en-US" baseline="0" dirty="0" smtClean="0"/>
-              <a:t>admin</a:t>
+              <a:t> </a:t>
             </a:r>
             <a:r>
               <a:rPr lang="ru-RU" baseline="0" dirty="0" smtClean="0"/>
-              <a:t>. Причем пользователь </a:t>
+              <a:t>или </a:t>
             </a:r>
             <a:r>
               <a:rPr lang="en-US" baseline="0" dirty="0" smtClean="0"/>
-              <a:t>admin</a:t>
+              <a:t>DFD</a:t>
             </a:r>
             <a:r>
               <a:rPr lang="ru-RU" baseline="0" dirty="0" smtClean="0"/>
-              <a:t> обладает более мощными привилегиями, чем</a:t>
-            </a:r>
-            <a:r>
-              <a:rPr lang="en-US" baseline="0" dirty="0" smtClean="0"/>
-              <a:t> user</a:t>
-            </a:r>
-            <a:r>
-              <a:rPr lang="ru-RU" baseline="0" dirty="0" smtClean="0"/>
-              <a:t>.</a:t>
-            </a:r>
-          </a:p>
-          <a:p>
-            <a:endParaRPr lang="ru-RU" baseline="0" dirty="0" smtClean="0"/>
-          </a:p>
-          <a:p>
-            <a:r>
-              <a:rPr lang="ru-RU" baseline="0" dirty="0" smtClean="0"/>
-              <a:t>Злоумышленник обладая только логином и паролем </a:t>
-            </a:r>
-            <a:r>
-              <a:rPr lang="en-US" baseline="0" dirty="0" smtClean="0"/>
-              <a:t>user</a:t>
-            </a:r>
-            <a:r>
-              <a:rPr lang="ru-RU" baseline="0" dirty="0" smtClean="0"/>
-              <a:t> может совершать действия, которые доступны только администратору.</a:t>
-            </a:r>
-          </a:p>
-          <a:p>
-            <a:endParaRPr lang="ru-RU" baseline="0" dirty="0" smtClean="0"/>
-          </a:p>
-          <a:p>
-            <a:endParaRPr lang="ru-RU" baseline="0" dirty="0" smtClean="0"/>
+              <a:t> диаграммы.</a:t>
+            </a:r>
           </a:p>
         </p:txBody>
       </p:sp>
@@ -1620,7 +1599,7 @@
     </p:spTree>
     <p:extLst>
       <p:ext uri="{BB962C8B-B14F-4D97-AF65-F5344CB8AC3E}">
-        <p14:creationId xmlns:p14="http://schemas.microsoft.com/office/powerpoint/2010/main" val="1348462960"/>
+        <p14:creationId xmlns:p14="http://schemas.microsoft.com/office/powerpoint/2010/main" val="3580288171"/>
       </p:ext>
     </p:extLst>
   </p:cSld>
@@ -1676,97 +1655,130 @@
           <a:p>
             <a:r>
               <a:rPr lang="ru-RU" baseline="0" dirty="0" smtClean="0"/>
-              <a:t>Теперь, что такое моделирование угроз</a:t>
+              <a:t>Вот в принципе все элементы, которые участвуют в </a:t>
+            </a:r>
+            <a:r>
+              <a:rPr lang="en-US" baseline="0" dirty="0" smtClean="0"/>
+              <a:t>DFD</a:t>
             </a:r>
             <a:r>
               <a:rPr lang="ru-RU" baseline="0" dirty="0" smtClean="0"/>
-              <a:t>?</a:t>
-            </a:r>
-            <a:endParaRPr lang="en-US" baseline="0" dirty="0" smtClean="0"/>
-          </a:p>
-          <a:p>
-            <a:endParaRPr lang="en-US" baseline="0" dirty="0" smtClean="0"/>
+              <a:t> диаграмме.</a:t>
+            </a:r>
+          </a:p>
+          <a:p>
+            <a:endParaRPr lang="ru-RU" baseline="0" dirty="0" smtClean="0"/>
           </a:p>
           <a:p>
             <a:r>
               <a:rPr lang="ru-RU" baseline="0" dirty="0" smtClean="0"/>
-              <a:t>Опять нам на помощь приходит чек-лист из 3-х пунктов.</a:t>
-            </a:r>
+              <a:t>Давайте по каждому поговорим более подробно:</a:t>
+            </a:r>
+          </a:p>
+          <a:p>
             <a:endParaRPr lang="ru-RU" baseline="0" dirty="0" smtClean="0"/>
           </a:p>
           <a:p>
+            <a:r>
+              <a:rPr lang="en-US" baseline="0" dirty="0" smtClean="0"/>
+              <a:t>External entity</a:t>
+            </a:r>
+            <a:r>
+              <a:rPr lang="ru-RU" baseline="0" dirty="0" smtClean="0"/>
+              <a:t> – это внешняя по отношению к нашей компоненте сущность – это либо пользователь, либо удаленный сервер, либо другое приложение. Важно – это активная сущность – то есть это не данные.</a:t>
+            </a:r>
+          </a:p>
+          <a:p>
             <a:endParaRPr lang="ru-RU" baseline="0" dirty="0" smtClean="0"/>
           </a:p>
           <a:p>
-            <a:pPr marL="0" indent="0">
-              <a:buNone/>
-            </a:pPr>
+            <a:r>
+              <a:rPr lang="en-US" baseline="0" dirty="0" smtClean="0"/>
+              <a:t>Process – </a:t>
+            </a:r>
             <a:r>
               <a:rPr lang="ru-RU" baseline="0" dirty="0" smtClean="0"/>
-              <a:t>Чтобы понимать, что угрожает нашей программе, мы должны идентифицировать угрозу. </a:t>
-            </a:r>
-          </a:p>
-          <a:p>
-            <a:pPr marL="0" indent="0">
-              <a:buNone/>
-            </a:pPr>
+              <a:t>это собственно наш исполняемый модуль, который выполняет полезные действия. Таких процессов может быть несколько. Например, обычные потоки </a:t>
+            </a:r>
+            <a:r>
+              <a:rPr lang="en-US" baseline="0" dirty="0" smtClean="0"/>
+              <a:t>(thread)</a:t>
+            </a:r>
             <a:r>
               <a:rPr lang="ru-RU" baseline="0" dirty="0" smtClean="0"/>
-              <a:t>Что это значит</a:t>
+              <a:t> могут быть такими процессами. Могут быть разные приложения, </a:t>
+            </a:r>
+            <a:r>
+              <a:rPr lang="en-US" baseline="0" dirty="0" err="1" smtClean="0"/>
+              <a:t>dll</a:t>
             </a:r>
             <a:r>
               <a:rPr lang="ru-RU" baseline="0" dirty="0" smtClean="0"/>
-              <a:t>? Это значит, что мы должны сопоставить этой угрозе одно из значений из списка </a:t>
-            </a:r>
+              <a:t> и т.д.</a:t>
+            </a:r>
+          </a:p>
+          <a:p>
+            <a:endParaRPr lang="ru-RU" baseline="0" dirty="0" smtClean="0"/>
+          </a:p>
+          <a:p>
             <a:r>
               <a:rPr lang="en-US" baseline="0" dirty="0" smtClean="0"/>
-              <a:t>STRIDE.</a:t>
-            </a:r>
+              <a:t>Data store – </a:t>
+            </a:r>
+            <a:r>
+              <a:rPr lang="ru-RU" baseline="0" dirty="0" smtClean="0"/>
+              <a:t>это всевозможные хранилища данных. Это могут быть как данные на диске, так и в памяти (если это имеет смысл). Это может быть база данных, реестр, </a:t>
+            </a:r>
+            <a:r>
+              <a:rPr lang="ru-RU" baseline="0" dirty="0" err="1" smtClean="0"/>
+              <a:t>конфиг</a:t>
+            </a:r>
+            <a:r>
+              <a:rPr lang="ru-RU" baseline="0" dirty="0" smtClean="0"/>
+              <a:t>-файл и т.д.</a:t>
+            </a:r>
+          </a:p>
+          <a:p>
             <a:endParaRPr lang="ru-RU" baseline="0" dirty="0" smtClean="0"/>
           </a:p>
           <a:p>
-            <a:pPr marL="0" indent="0">
-              <a:buNone/>
-            </a:pPr>
+            <a:r>
+              <a:rPr lang="en-US" baseline="0" dirty="0" smtClean="0"/>
+              <a:t>Trust boundary</a:t>
+            </a:r>
+            <a:r>
+              <a:rPr lang="ru-RU" baseline="0" dirty="0" smtClean="0"/>
+              <a:t> – это граница, позволяющая объединить несколько процессов в одну группу. Например, если несколько процессов выполняются под одним и тем же пользователем, то их можно объединить в одну группу.</a:t>
+            </a:r>
+          </a:p>
+          <a:p>
             <a:endParaRPr lang="ru-RU" baseline="0" dirty="0" smtClean="0"/>
           </a:p>
           <a:p>
+            <a:r>
+              <a:rPr lang="ru-RU" baseline="0" dirty="0" smtClean="0"/>
+              <a:t>Также можно отсекать границы доверия, например, когда данные уходят или приходят по сети, то это тоже граница доверия – только в этом случае она будет называться по другому – граница доверия локальной машины.</a:t>
+            </a:r>
+          </a:p>
+          <a:p>
             <a:endParaRPr lang="ru-RU" baseline="0" dirty="0" smtClean="0"/>
           </a:p>
           <a:p>
+            <a:endParaRPr lang="ru-RU" baseline="0" dirty="0" smtClean="0"/>
+          </a:p>
+          <a:p>
             <a:r>
               <a:rPr lang="ru-RU" baseline="0" dirty="0" smtClean="0"/>
-              <a:t>После этого мы должны все угрозы составить в список, чтобы он был перед глазами.</a:t>
-            </a:r>
-          </a:p>
-          <a:p>
-            <a:endParaRPr lang="ru-RU" baseline="0" dirty="0" smtClean="0"/>
-          </a:p>
-          <a:p>
+              <a:t>Итак, все это звучит по умному, давайте я вам покажу наглядный пример, как нарисовать такую </a:t>
+            </a:r>
+            <a:r>
+              <a:rPr lang="en-US" baseline="0" dirty="0" smtClean="0"/>
+              <a:t>DFD</a:t>
+            </a:r>
             <a:r>
               <a:rPr lang="ru-RU" baseline="0" dirty="0" smtClean="0"/>
-              <a:t>И в конце мы должны эти угрозы </a:t>
-            </a:r>
-            <a:r>
-              <a:rPr lang="ru-RU" baseline="0" dirty="0" err="1" smtClean="0"/>
-              <a:t>приоритезировать</a:t>
-            </a:r>
-            <a:r>
-              <a:rPr lang="ru-RU" baseline="0" dirty="0" smtClean="0"/>
-              <a:t>. Этот пункт очень важный и очень сложный. </a:t>
-            </a:r>
-            <a:r>
-              <a:rPr lang="ru-RU" baseline="0" dirty="0" smtClean="0"/>
-              <a:t>Важно понимать, какие угрозы наиболее реальны, какие нет. Какие угрозы несут большой вред системе, какие нет. В общем нужно угрозы переупорядочить, и работать с ними начиная с самой важной</a:t>
-            </a:r>
-            <a:r>
-              <a:rPr lang="ru-RU" baseline="0" dirty="0" smtClean="0"/>
-              <a:t>.</a:t>
-            </a:r>
-            <a:endParaRPr lang="en-US" baseline="0" dirty="0" smtClean="0"/>
-          </a:p>
-          <a:p>
-            <a:endParaRPr lang="ru-RU" baseline="0" dirty="0" smtClean="0"/>
+              <a:t> диаграмму</a:t>
+            </a:r>
           </a:p>
         </p:txBody>
       </p:sp>
@@ -1797,7 +1809,7 @@
     </p:spTree>
     <p:extLst>
       <p:ext uri="{BB962C8B-B14F-4D97-AF65-F5344CB8AC3E}">
-        <p14:creationId xmlns:p14="http://schemas.microsoft.com/office/powerpoint/2010/main" val="2081521291"/>
+        <p14:creationId xmlns:p14="http://schemas.microsoft.com/office/powerpoint/2010/main" val="78102990"/>
       </p:ext>
     </p:extLst>
   </p:cSld>
@@ -1853,47 +1865,7 @@
           <a:p>
             <a:r>
               <a:rPr lang="ru-RU" baseline="0" dirty="0" smtClean="0"/>
-              <a:t>Давайте вернемся к пункту 1 – идентификация угроз.</a:t>
-            </a:r>
-          </a:p>
-          <a:p>
-            <a:endParaRPr lang="ru-RU" baseline="0" dirty="0" smtClean="0"/>
-          </a:p>
-          <a:p>
-            <a:r>
-              <a:rPr lang="ru-RU" baseline="0" dirty="0" smtClean="0"/>
-              <a:t>Как мы это будем делать?</a:t>
-            </a:r>
-          </a:p>
-          <a:p>
-            <a:r>
-              <a:rPr lang="ru-RU" baseline="0" dirty="0" smtClean="0"/>
-              <a:t>Можно с наскоку навалиться на весь проект. Но такой подход вряд ли нам поможет при моделировании угроз в более-менее серьезном проекте.</a:t>
-            </a:r>
-          </a:p>
-          <a:p>
-            <a:endParaRPr lang="ru-RU" baseline="0" dirty="0" smtClean="0"/>
-          </a:p>
-          <a:p>
-            <a:r>
-              <a:rPr lang="ru-RU" baseline="0" dirty="0" smtClean="0"/>
-              <a:t>Опять же, есть формальный подход к идентификации и поиску всех угроз – это </a:t>
-            </a:r>
-            <a:r>
-              <a:rPr lang="en-US" baseline="0" dirty="0" smtClean="0"/>
-              <a:t>Data Flow </a:t>
-            </a:r>
-            <a:r>
-              <a:rPr lang="ru-RU" baseline="0" dirty="0" smtClean="0"/>
-              <a:t>Диаграммы</a:t>
-            </a:r>
-            <a:r>
-              <a:rPr lang="en-US" baseline="0" dirty="0" smtClean="0"/>
-              <a:t> </a:t>
-            </a:r>
-            <a:r>
-              <a:rPr lang="ru-RU" baseline="0" dirty="0" smtClean="0"/>
-              <a:t>или </a:t>
+              <a:t>Вот в качестве примера я привел </a:t>
             </a:r>
             <a:r>
               <a:rPr lang="en-US" baseline="0" dirty="0" smtClean="0"/>
@@ -1901,8 +1873,27 @@
             </a:r>
             <a:r>
               <a:rPr lang="ru-RU" baseline="0" dirty="0" smtClean="0"/>
-              <a:t> диаграммы.</a:t>
-            </a:r>
+              <a:t> диаграмму какого-то сервера, который принимает запросы по сети от пользователя и складывает их в базу.</a:t>
+            </a:r>
+            <a:endParaRPr lang="en-US" baseline="0" dirty="0" smtClean="0"/>
+          </a:p>
+          <a:p>
+            <a:endParaRPr lang="en-US" baseline="0" dirty="0" smtClean="0"/>
+          </a:p>
+          <a:p>
+            <a:r>
+              <a:rPr lang="ru-RU" baseline="0" dirty="0" smtClean="0"/>
+              <a:t>Я это делал в программе </a:t>
+            </a:r>
+            <a:r>
+              <a:rPr lang="en-US" baseline="0" dirty="0" smtClean="0"/>
+              <a:t>Microsoft </a:t>
+            </a:r>
+            <a:r>
+              <a:rPr lang="en-US" baseline="0" smtClean="0"/>
+              <a:t>Threat Modelling Tool.</a:t>
+            </a:r>
+            <a:endParaRPr lang="ru-RU" baseline="0" dirty="0" smtClean="0"/>
           </a:p>
         </p:txBody>
       </p:sp>
@@ -1933,7 +1924,7 @@
     </p:spTree>
     <p:extLst>
       <p:ext uri="{BB962C8B-B14F-4D97-AF65-F5344CB8AC3E}">
-        <p14:creationId xmlns:p14="http://schemas.microsoft.com/office/powerpoint/2010/main" val="3580288171"/>
+        <p14:creationId xmlns:p14="http://schemas.microsoft.com/office/powerpoint/2010/main" val="2345022417"/>
       </p:ext>
     </p:extLst>
   </p:cSld>
@@ -1989,7 +1980,7 @@
           <a:p>
             <a:r>
               <a:rPr lang="ru-RU" baseline="0" dirty="0" smtClean="0"/>
-              <a:t>Вот в принципе все элементы, которые участвуют в </a:t>
+              <a:t>Ну и напоследок, табличка, облегчающая анализ </a:t>
             </a:r>
             <a:r>
               <a:rPr lang="en-US" baseline="0" dirty="0" smtClean="0"/>
@@ -1997,122 +1988,21 @@
             </a:r>
             <a:r>
               <a:rPr lang="ru-RU" baseline="0" dirty="0" smtClean="0"/>
-              <a:t> диаграмме.</a:t>
+              <a:t> диаграмм на наличие угроз</a:t>
+            </a:r>
+            <a:r>
+              <a:rPr lang="en-US" baseline="0" dirty="0" smtClean="0"/>
+              <a:t>.</a:t>
+            </a:r>
+          </a:p>
+          <a:p>
+            <a:r>
+              <a:rPr lang="ru-RU" baseline="0" dirty="0" smtClean="0"/>
+              <a:t>В соответствии с этой табличкой вы можете проводить быстрый анализ угроз.</a:t>
             </a:r>
           </a:p>
           <a:p>
             <a:endParaRPr lang="ru-RU" baseline="0" dirty="0" smtClean="0"/>
-          </a:p>
-          <a:p>
-            <a:r>
-              <a:rPr lang="ru-RU" baseline="0" dirty="0" smtClean="0"/>
-              <a:t>Давайте по каждому поговорим более подробно:</a:t>
-            </a:r>
-          </a:p>
-          <a:p>
-            <a:endParaRPr lang="ru-RU" baseline="0" dirty="0" smtClean="0"/>
-          </a:p>
-          <a:p>
-            <a:r>
-              <a:rPr lang="en-US" baseline="0" dirty="0" smtClean="0"/>
-              <a:t>External entity</a:t>
-            </a:r>
-            <a:r>
-              <a:rPr lang="ru-RU" baseline="0" dirty="0" smtClean="0"/>
-              <a:t> – это внешняя по отношению к нашей компоненте сущность – это либо пользователь, либо удаленный сервер, либо другое приложение. Важно – это активная сущность – то есть это не данные.</a:t>
-            </a:r>
-          </a:p>
-          <a:p>
-            <a:endParaRPr lang="ru-RU" baseline="0" dirty="0" smtClean="0"/>
-          </a:p>
-          <a:p>
-            <a:r>
-              <a:rPr lang="en-US" baseline="0" dirty="0" smtClean="0"/>
-              <a:t>Process – </a:t>
-            </a:r>
-            <a:r>
-              <a:rPr lang="ru-RU" baseline="0" dirty="0" smtClean="0"/>
-              <a:t>это собственно наш исполняемый модуль, который выполняет полезные действия. Таких процессов может быть несколько. Например, обычные потоки </a:t>
-            </a:r>
-            <a:r>
-              <a:rPr lang="en-US" baseline="0" dirty="0" smtClean="0"/>
-              <a:t>(thread)</a:t>
-            </a:r>
-            <a:r>
-              <a:rPr lang="ru-RU" baseline="0" dirty="0" smtClean="0"/>
-              <a:t> могут быть такими процессами. Могут быть разные приложения, </a:t>
-            </a:r>
-            <a:r>
-              <a:rPr lang="en-US" baseline="0" dirty="0" err="1" smtClean="0"/>
-              <a:t>dll</a:t>
-            </a:r>
-            <a:r>
-              <a:rPr lang="ru-RU" baseline="0" dirty="0" smtClean="0"/>
-              <a:t> и т.д.</a:t>
-            </a:r>
-          </a:p>
-          <a:p>
-            <a:endParaRPr lang="ru-RU" baseline="0" dirty="0" smtClean="0"/>
-          </a:p>
-          <a:p>
-            <a:r>
-              <a:rPr lang="en-US" baseline="0" dirty="0" smtClean="0"/>
-              <a:t>Data store – </a:t>
-            </a:r>
-            <a:r>
-              <a:rPr lang="ru-RU" baseline="0" dirty="0" smtClean="0"/>
-              <a:t>это всевозможные хранилища данных. Это могут быть как данные на диске, так и в памяти (если это имеет смысл). Это может быть база данных, реестр, </a:t>
-            </a:r>
-            <a:r>
-              <a:rPr lang="ru-RU" baseline="0" dirty="0" err="1" smtClean="0"/>
-              <a:t>конфиг</a:t>
-            </a:r>
-            <a:r>
-              <a:rPr lang="ru-RU" baseline="0" dirty="0" smtClean="0"/>
-              <a:t>-файл и т.д.</a:t>
-            </a:r>
-          </a:p>
-          <a:p>
-            <a:endParaRPr lang="ru-RU" baseline="0" dirty="0" smtClean="0"/>
-          </a:p>
-          <a:p>
-            <a:r>
-              <a:rPr lang="en-US" baseline="0" dirty="0" smtClean="0"/>
-              <a:t>Trust boundary</a:t>
-            </a:r>
-            <a:r>
-              <a:rPr lang="ru-RU" baseline="0" dirty="0" smtClean="0"/>
-              <a:t> – это граница, позволяющая объединить несколько процессов в одну группу. Например, если несколько процессов выполняются под одним и тем же пользователем, то их можно объединить в одну группу.</a:t>
-            </a:r>
-          </a:p>
-          <a:p>
-            <a:endParaRPr lang="ru-RU" baseline="0" dirty="0" smtClean="0"/>
-          </a:p>
-          <a:p>
-            <a:r>
-              <a:rPr lang="ru-RU" baseline="0" dirty="0" smtClean="0"/>
-              <a:t>Также можно отсекать границы доверия, например, когда данные уходят или приходят по сети, то это тоже граница доверия – только в этом случае она будет называться по другому – граница доверия локальной машины.</a:t>
-            </a:r>
-          </a:p>
-          <a:p>
-            <a:endParaRPr lang="ru-RU" baseline="0" dirty="0" smtClean="0"/>
-          </a:p>
-          <a:p>
-            <a:endParaRPr lang="ru-RU" baseline="0" dirty="0" smtClean="0"/>
-          </a:p>
-          <a:p>
-            <a:r>
-              <a:rPr lang="ru-RU" baseline="0" dirty="0" smtClean="0"/>
-              <a:t>Итак, все это звучит по умному, давайте я вам покажу наглядный пример, как нарисовать такую </a:t>
-            </a:r>
-            <a:r>
-              <a:rPr lang="en-US" baseline="0" dirty="0" smtClean="0"/>
-              <a:t>DFD</a:t>
-            </a:r>
-            <a:r>
-              <a:rPr lang="ru-RU" baseline="0" dirty="0" smtClean="0"/>
-              <a:t> диаграмму</a:t>
-            </a:r>
           </a:p>
         </p:txBody>
       </p:sp>
@@ -2143,7 +2033,7 @@
     </p:spTree>
     <p:extLst>
       <p:ext uri="{BB962C8B-B14F-4D97-AF65-F5344CB8AC3E}">
-        <p14:creationId xmlns:p14="http://schemas.microsoft.com/office/powerpoint/2010/main" val="78102990"/>
+        <p14:creationId xmlns:p14="http://schemas.microsoft.com/office/powerpoint/2010/main" val="3168373287"/>
       </p:ext>
     </p:extLst>
   </p:cSld>
@@ -2197,9 +2087,69 @@
           <a:bodyPr/>
           <a:lstStyle/>
           <a:p>
+            <a:pPr marL="0" marR="0" lvl="0" indent="0" algn="l" defTabSz="1161105" rtl="0" eaLnBrk="1" fontAlgn="auto" latinLnBrk="0" hangingPunct="1">
+              <a:lnSpc>
+                <a:spcPct val="100000"/>
+              </a:lnSpc>
+              <a:spcBef>
+                <a:spcPts val="0"/>
+              </a:spcBef>
+              <a:spcAft>
+                <a:spcPts val="0"/>
+              </a:spcAft>
+              <a:buClrTx/>
+              <a:buSzTx/>
+              <a:buFontTx/>
+              <a:buNone/>
+              <a:tabLst/>
+              <a:defRPr/>
+            </a:pPr>
             <a:r>
               <a:rPr lang="ru-RU" baseline="0" dirty="0" smtClean="0"/>
-              <a:t>Вот в качестве примера я привел </a:t>
+              <a:t>Ну и напоследок, один вопрос, что мы со всей этой информацией будем делать?</a:t>
+            </a:r>
+          </a:p>
+          <a:p>
+            <a:pPr marL="0" marR="0" lvl="0" indent="0" algn="l" defTabSz="1161105" rtl="0" eaLnBrk="1" fontAlgn="auto" latinLnBrk="0" hangingPunct="1">
+              <a:lnSpc>
+                <a:spcPct val="100000"/>
+              </a:lnSpc>
+              <a:spcBef>
+                <a:spcPts val="0"/>
+              </a:spcBef>
+              <a:spcAft>
+                <a:spcPts val="0"/>
+              </a:spcAft>
+              <a:buClrTx/>
+              <a:buSzTx/>
+              <a:buFontTx/>
+              <a:buNone/>
+              <a:tabLst/>
+              <a:defRPr/>
+            </a:pPr>
+            <a:endParaRPr lang="ru-RU" baseline="0" dirty="0" smtClean="0"/>
+          </a:p>
+          <a:p>
+            <a:pPr marL="0" marR="0" lvl="0" indent="0" algn="l" defTabSz="1161105" rtl="0" eaLnBrk="1" fontAlgn="auto" latinLnBrk="0" hangingPunct="1">
+              <a:lnSpc>
+                <a:spcPct val="100000"/>
+              </a:lnSpc>
+              <a:spcBef>
+                <a:spcPts val="0"/>
+              </a:spcBef>
+              <a:spcAft>
+                <a:spcPts val="0"/>
+              </a:spcAft>
+              <a:buClrTx/>
+              <a:buSzTx/>
+              <a:buFontTx/>
+              <a:buNone/>
+              <a:tabLst/>
+              <a:defRPr/>
+            </a:pPr>
+            <a:r>
+              <a:rPr lang="ru-RU" baseline="0" dirty="0" smtClean="0"/>
+              <a:t>Вот мы построили </a:t>
             </a:r>
             <a:r>
               <a:rPr lang="en-US" baseline="0" dirty="0" smtClean="0"/>
@@ -2207,30 +2157,273 @@
             </a:r>
             <a:r>
               <a:rPr lang="ru-RU" baseline="0" dirty="0" smtClean="0"/>
-              <a:t> диаграмму какого-то сервера, который принимает запросы по сети от пользователя и складывает их в базу</a:t>
-            </a:r>
+              <a:t> диаграммы, выписали все угрозы. Что теперь с этим делать.</a:t>
+            </a:r>
+          </a:p>
+          <a:p>
+            <a:pPr marL="0" marR="0" lvl="0" indent="0" algn="l" defTabSz="1161105" rtl="0" eaLnBrk="1" fontAlgn="auto" latinLnBrk="0" hangingPunct="1">
+              <a:lnSpc>
+                <a:spcPct val="100000"/>
+              </a:lnSpc>
+              <a:spcBef>
+                <a:spcPts val="0"/>
+              </a:spcBef>
+              <a:spcAft>
+                <a:spcPts val="0"/>
+              </a:spcAft>
+              <a:buClrTx/>
+              <a:buSzTx/>
+              <a:buFontTx/>
+              <a:buNone/>
+              <a:tabLst/>
+              <a:defRPr/>
+            </a:pPr>
+            <a:endParaRPr lang="ru-RU" baseline="0" dirty="0" smtClean="0"/>
+          </a:p>
+          <a:p>
+            <a:pPr marL="0" marR="0" lvl="0" indent="0" algn="l" defTabSz="1161105" rtl="0" eaLnBrk="1" fontAlgn="auto" latinLnBrk="0" hangingPunct="1">
+              <a:lnSpc>
+                <a:spcPct val="100000"/>
+              </a:lnSpc>
+              <a:spcBef>
+                <a:spcPts val="0"/>
+              </a:spcBef>
+              <a:spcAft>
+                <a:spcPts val="0"/>
+              </a:spcAft>
+              <a:buClrTx/>
+              <a:buSzTx/>
+              <a:buFontTx/>
+              <a:buNone/>
+              <a:tabLst/>
+              <a:defRPr/>
+            </a:pPr>
             <a:r>
               <a:rPr lang="ru-RU" baseline="0" dirty="0" smtClean="0"/>
-              <a:t>.</a:t>
-            </a:r>
-            <a:endParaRPr lang="en-US" baseline="0" dirty="0" smtClean="0"/>
-          </a:p>
-          <a:p>
-            <a:endParaRPr lang="en-US" baseline="0" dirty="0" smtClean="0"/>
-          </a:p>
-          <a:p>
+              <a:t>В </a:t>
+            </a:r>
+            <a:r>
+              <a:rPr lang="en-US" baseline="0" dirty="0" smtClean="0"/>
+              <a:t>SDL </a:t>
+            </a:r>
             <a:r>
               <a:rPr lang="ru-RU" baseline="0" dirty="0" smtClean="0"/>
-              <a:t>Я это делал в программе </a:t>
+              <a:t>есть такое понятие </a:t>
             </a:r>
             <a:r>
               <a:rPr lang="en-US" baseline="0" dirty="0" smtClean="0"/>
-              <a:t>Microsoft </a:t>
-            </a:r>
-            <a:r>
-              <a:rPr lang="en-US" baseline="0" smtClean="0"/>
-              <a:t>Threat Modelling Tool.</a:t>
-            </a:r>
+              <a:t>threat mitigation – </a:t>
+            </a:r>
+            <a:r>
+              <a:rPr lang="ru-RU" baseline="0" dirty="0" smtClean="0"/>
+              <a:t>смягчение угрозы.</a:t>
+            </a:r>
+          </a:p>
+          <a:p>
+            <a:pPr marL="0" marR="0" lvl="0" indent="0" algn="l" defTabSz="1161105" rtl="0" eaLnBrk="1" fontAlgn="auto" latinLnBrk="0" hangingPunct="1">
+              <a:lnSpc>
+                <a:spcPct val="100000"/>
+              </a:lnSpc>
+              <a:spcBef>
+                <a:spcPts val="0"/>
+              </a:spcBef>
+              <a:spcAft>
+                <a:spcPts val="0"/>
+              </a:spcAft>
+              <a:buClrTx/>
+              <a:buSzTx/>
+              <a:buFontTx/>
+              <a:buNone/>
+              <a:tabLst/>
+              <a:defRPr/>
+            </a:pPr>
+            <a:r>
+              <a:rPr lang="ru-RU" baseline="0" dirty="0" smtClean="0"/>
+              <a:t>Это такая последовательность действий, которая призвана уменьшить угрозу до приемлемого уровня, или совсем от нее избавиться.</a:t>
+            </a:r>
+          </a:p>
+          <a:p>
+            <a:pPr marL="0" marR="0" lvl="0" indent="0" algn="l" defTabSz="1161105" rtl="0" eaLnBrk="1" fontAlgn="auto" latinLnBrk="0" hangingPunct="1">
+              <a:lnSpc>
+                <a:spcPct val="100000"/>
+              </a:lnSpc>
+              <a:spcBef>
+                <a:spcPts val="0"/>
+              </a:spcBef>
+              <a:spcAft>
+                <a:spcPts val="0"/>
+              </a:spcAft>
+              <a:buClrTx/>
+              <a:buSzTx/>
+              <a:buFontTx/>
+              <a:buNone/>
+              <a:tabLst/>
+              <a:defRPr/>
+            </a:pPr>
+            <a:endParaRPr lang="ru-RU" baseline="0" dirty="0" smtClean="0"/>
+          </a:p>
+          <a:p>
+            <a:pPr marL="0" marR="0" lvl="0" indent="0" algn="l" defTabSz="1161105" rtl="0" eaLnBrk="1" fontAlgn="auto" latinLnBrk="0" hangingPunct="1">
+              <a:lnSpc>
+                <a:spcPct val="100000"/>
+              </a:lnSpc>
+              <a:spcBef>
+                <a:spcPts val="0"/>
+              </a:spcBef>
+              <a:spcAft>
+                <a:spcPts val="0"/>
+              </a:spcAft>
+              <a:buClrTx/>
+              <a:buSzTx/>
+              <a:buFontTx/>
+              <a:buNone/>
+              <a:tabLst/>
+              <a:defRPr/>
+            </a:pPr>
+            <a:r>
+              <a:rPr lang="ru-RU" baseline="0" dirty="0" smtClean="0"/>
+              <a:t>Бывают разные способы </a:t>
+            </a:r>
+            <a:r>
+              <a:rPr lang="ru-RU" baseline="0" dirty="0" err="1" smtClean="0"/>
+              <a:t>митигации</a:t>
+            </a:r>
+            <a:r>
+              <a:rPr lang="ru-RU" baseline="0" dirty="0" smtClean="0"/>
+              <a:t> угроз:</a:t>
+            </a:r>
+          </a:p>
+          <a:p>
+            <a:pPr marL="0" marR="0" lvl="0" indent="0" algn="l" defTabSz="1161105" rtl="0" eaLnBrk="1" fontAlgn="auto" latinLnBrk="0" hangingPunct="1">
+              <a:lnSpc>
+                <a:spcPct val="100000"/>
+              </a:lnSpc>
+              <a:spcBef>
+                <a:spcPts val="0"/>
+              </a:spcBef>
+              <a:spcAft>
+                <a:spcPts val="0"/>
+              </a:spcAft>
+              <a:buClrTx/>
+              <a:buSzTx/>
+              <a:buFontTx/>
+              <a:buNone/>
+              <a:tabLst/>
+              <a:defRPr/>
+            </a:pPr>
+            <a:endParaRPr lang="ru-RU" baseline="0" dirty="0" smtClean="0"/>
+          </a:p>
+          <a:p>
+            <a:pPr marL="342900" marR="0" lvl="0" indent="-342900" algn="l" defTabSz="1161105" rtl="0" eaLnBrk="1" fontAlgn="auto" latinLnBrk="0" hangingPunct="1">
+              <a:lnSpc>
+                <a:spcPct val="100000"/>
+              </a:lnSpc>
+              <a:spcBef>
+                <a:spcPts val="0"/>
+              </a:spcBef>
+              <a:spcAft>
+                <a:spcPts val="0"/>
+              </a:spcAft>
+              <a:buClrTx/>
+              <a:buSzTx/>
+              <a:buFontTx/>
+              <a:buAutoNum type="arabicPeriod"/>
+              <a:tabLst/>
+              <a:defRPr/>
+            </a:pPr>
+            <a:r>
+              <a:rPr lang="ru-RU" baseline="0" dirty="0" smtClean="0"/>
+              <a:t>Например, мы можем на этапе дизайна переработать (или вообще убрать) потоки данных или приложение, так что угроза исчезнет.</a:t>
+            </a:r>
+          </a:p>
+          <a:p>
+            <a:pPr marL="342900" marR="0" lvl="0" indent="-342900" algn="l" defTabSz="1161105" rtl="0" eaLnBrk="1" fontAlgn="auto" latinLnBrk="0" hangingPunct="1">
+              <a:lnSpc>
+                <a:spcPct val="100000"/>
+              </a:lnSpc>
+              <a:spcBef>
+                <a:spcPts val="0"/>
+              </a:spcBef>
+              <a:spcAft>
+                <a:spcPts val="0"/>
+              </a:spcAft>
+              <a:buClrTx/>
+              <a:buSzTx/>
+              <a:buFontTx/>
+              <a:buAutoNum type="arabicPeriod"/>
+              <a:tabLst/>
+              <a:defRPr/>
+            </a:pPr>
+            <a:r>
+              <a:rPr lang="ru-RU" baseline="0" dirty="0" smtClean="0"/>
+              <a:t>Мы можем использовать какую-то стандартную </a:t>
+            </a:r>
+            <a:r>
+              <a:rPr lang="ru-RU" baseline="0" dirty="0" err="1" smtClean="0"/>
+              <a:t>митигацию</a:t>
+            </a:r>
+            <a:r>
+              <a:rPr lang="ru-RU" baseline="0" dirty="0" smtClean="0"/>
+              <a:t> (об этом позже).</a:t>
+            </a:r>
+          </a:p>
+          <a:p>
+            <a:pPr marL="342900" marR="0" lvl="0" indent="-342900" algn="l" defTabSz="1161105" rtl="0" eaLnBrk="1" fontAlgn="auto" latinLnBrk="0" hangingPunct="1">
+              <a:lnSpc>
+                <a:spcPct val="100000"/>
+              </a:lnSpc>
+              <a:spcBef>
+                <a:spcPts val="0"/>
+              </a:spcBef>
+              <a:spcAft>
+                <a:spcPts val="0"/>
+              </a:spcAft>
+              <a:buClrTx/>
+              <a:buSzTx/>
+              <a:buFontTx/>
+              <a:buAutoNum type="arabicPeriod"/>
+              <a:tabLst/>
+              <a:defRPr/>
+            </a:pPr>
+            <a:r>
+              <a:rPr lang="ru-RU" baseline="0" dirty="0" smtClean="0"/>
+              <a:t>Мы можем внести описание угрозы в публичную документацию к нашей программе. Например: внимание, данная программа не обеспечивает конфиденциальности данных. Пожалуйста, используйте другие программы по защите данных, например </a:t>
+            </a:r>
+            <a:r>
+              <a:rPr lang="en-US" baseline="0" dirty="0" err="1" smtClean="0"/>
+              <a:t>GnuPG</a:t>
+            </a:r>
+            <a:r>
+              <a:rPr lang="ru-RU" baseline="0" dirty="0" smtClean="0"/>
+              <a:t>. Или, для того чтобы обезопасить себя от утечки данных, настройте </a:t>
+            </a:r>
+            <a:r>
+              <a:rPr lang="en-US" baseline="0" dirty="0" err="1" smtClean="0"/>
+              <a:t>FireWall</a:t>
+            </a:r>
+            <a:r>
+              <a:rPr lang="ru-RU" baseline="0" dirty="0" smtClean="0"/>
+              <a:t>, так чтобы он блокировал все соединения на порту 8080.</a:t>
+            </a:r>
+          </a:p>
+          <a:p>
+            <a:pPr marL="342900" marR="0" lvl="0" indent="-342900" algn="l" defTabSz="1161105" rtl="0" eaLnBrk="1" fontAlgn="auto" latinLnBrk="0" hangingPunct="1">
+              <a:lnSpc>
+                <a:spcPct val="100000"/>
+              </a:lnSpc>
+              <a:spcBef>
+                <a:spcPts val="0"/>
+              </a:spcBef>
+              <a:spcAft>
+                <a:spcPts val="0"/>
+              </a:spcAft>
+              <a:buClrTx/>
+              <a:buSzTx/>
+              <a:buFontTx/>
+              <a:buAutoNum type="arabicPeriod"/>
+              <a:tabLst/>
+              <a:defRPr/>
+            </a:pPr>
             <a:endParaRPr lang="ru-RU" baseline="0" dirty="0" smtClean="0"/>
           </a:p>
         </p:txBody>
@@ -2262,7 +2455,7 @@
     </p:spTree>
     <p:extLst>
       <p:ext uri="{BB962C8B-B14F-4D97-AF65-F5344CB8AC3E}">
-        <p14:creationId xmlns:p14="http://schemas.microsoft.com/office/powerpoint/2010/main" val="2345022417"/>
+        <p14:creationId xmlns:p14="http://schemas.microsoft.com/office/powerpoint/2010/main" val="2840477499"/>
       </p:ext>
     </p:extLst>
   </p:cSld>
@@ -2316,31 +2509,40 @@
           <a:bodyPr/>
           <a:lstStyle/>
           <a:p>
+            <a:pPr marL="0" marR="0" lvl="0" indent="0" algn="l" defTabSz="1161105" rtl="0" eaLnBrk="1" fontAlgn="auto" latinLnBrk="0" hangingPunct="1">
+              <a:lnSpc>
+                <a:spcPct val="100000"/>
+              </a:lnSpc>
+              <a:spcBef>
+                <a:spcPts val="0"/>
+              </a:spcBef>
+              <a:spcAft>
+                <a:spcPts val="0"/>
+              </a:spcAft>
+              <a:buClrTx/>
+              <a:buSzTx/>
+              <a:buFontTx/>
+              <a:buNone/>
+              <a:tabLst/>
+              <a:defRPr/>
+            </a:pPr>
             <a:r>
               <a:rPr lang="ru-RU" baseline="0" dirty="0" smtClean="0"/>
-              <a:t>Ну и напоследок, табличка, облегчающая анализ </a:t>
-            </a:r>
-            <a:r>
-              <a:rPr lang="en-US" baseline="0" dirty="0" smtClean="0"/>
-              <a:t>DFD</a:t>
+              <a:t>Здесь представлены стандартные варианты </a:t>
+            </a:r>
+            <a:r>
+              <a:rPr lang="ru-RU" baseline="0" dirty="0" err="1" smtClean="0"/>
+              <a:t>митигации</a:t>
             </a:r>
             <a:r>
               <a:rPr lang="ru-RU" baseline="0" dirty="0" smtClean="0"/>
-              <a:t> диаграмм на наличие угроз</a:t>
-            </a:r>
-            <a:r>
-              <a:rPr lang="en-US" baseline="0" dirty="0" smtClean="0"/>
-              <a:t>.</a:t>
-            </a:r>
-          </a:p>
-          <a:p>
-            <a:r>
-              <a:rPr lang="ru-RU" baseline="0" dirty="0" smtClean="0"/>
-              <a:t>В соответствии с этой табличкой вы можете проводить быстрый анализ угроз.</a:t>
-            </a:r>
-          </a:p>
-          <a:p>
-            <a:endParaRPr lang="ru-RU" baseline="0" dirty="0" smtClean="0"/>
+              <a:t> </a:t>
+            </a:r>
+            <a:r>
+              <a:rPr lang="ru-RU" baseline="0" smtClean="0"/>
+              <a:t>угроз.</a:t>
+            </a:r>
+            <a:endParaRPr lang="en-US" baseline="0" dirty="0" smtClean="0"/>
           </a:p>
         </p:txBody>
       </p:sp>
@@ -2371,7 +2573,7 @@
     </p:spTree>
     <p:extLst>
       <p:ext uri="{BB962C8B-B14F-4D97-AF65-F5344CB8AC3E}">
-        <p14:creationId xmlns:p14="http://schemas.microsoft.com/office/powerpoint/2010/main" val="3168373287"/>
+        <p14:creationId xmlns:p14="http://schemas.microsoft.com/office/powerpoint/2010/main" val="1112912105"/>
       </p:ext>
     </p:extLst>
   </p:cSld>
@@ -2920,7 +3122,7 @@
       </p:grpSpPr>
       <p:sp>
         <p:nvSpPr>
-          <p:cNvPr id="2" name="Образ слайда 1"/>
+          <p:cNvPr id="2" name="Slide Image Placeholder 1"/>
           <p:cNvSpPr>
             <a:spLocks noGrp="1" noRot="1" noChangeAspect="1"/>
           </p:cNvSpPr>
@@ -2932,7 +3134,7 @@
       </p:sp>
       <p:sp>
         <p:nvSpPr>
-          <p:cNvPr id="3" name="Заметки 2"/>
+          <p:cNvPr id="3" name="Notes Placeholder 2"/>
           <p:cNvSpPr>
             <a:spLocks noGrp="1"/>
           </p:cNvSpPr>
@@ -2945,7 +3147,7 @@
           <a:bodyPr/>
           <a:lstStyle/>
           <a:p>
-            <a:pPr marL="0" marR="0" lvl="0" indent="0" algn="l" defTabSz="1161105" rtl="0" eaLnBrk="1" fontAlgn="auto" latinLnBrk="0" hangingPunct="1">
+            <a:pPr marL="0" marR="0" indent="0" algn="l" defTabSz="1161105" rtl="0" eaLnBrk="1" fontAlgn="auto" latinLnBrk="0" hangingPunct="1">
               <a:lnSpc>
                 <a:spcPct val="100000"/>
               </a:lnSpc>
@@ -2963,332 +3165,19 @@
               <a:defRPr/>
             </a:pPr>
             <a:r>
-              <a:rPr lang="ru-RU" baseline="0" dirty="0" smtClean="0"/>
-              <a:t>Ну и напоследок, один вопрос, что мы со всей этой информацией будем делать?</a:t>
-            </a:r>
-          </a:p>
-          <a:p>
-            <a:pPr marL="0" marR="0" lvl="0" indent="0" algn="l" defTabSz="1161105" rtl="0" eaLnBrk="1" fontAlgn="auto" latinLnBrk="0" hangingPunct="1">
-              <a:lnSpc>
-                <a:spcPct val="100000"/>
-              </a:lnSpc>
-              <a:spcBef>
-                <a:spcPts val="0"/>
-              </a:spcBef>
-              <a:spcAft>
-                <a:spcPts val="0"/>
-              </a:spcAft>
-              <a:buClrTx/>
-              <a:buSzTx/>
-              <a:buFontTx/>
-              <a:buNone/>
-              <a:tabLst/>
-              <a:defRPr/>
-            </a:pPr>
-            <a:endParaRPr lang="ru-RU" baseline="0" dirty="0" smtClean="0"/>
-          </a:p>
-          <a:p>
-            <a:pPr marL="0" marR="0" lvl="0" indent="0" algn="l" defTabSz="1161105" rtl="0" eaLnBrk="1" fontAlgn="auto" latinLnBrk="0" hangingPunct="1">
-              <a:lnSpc>
-                <a:spcPct val="100000"/>
-              </a:lnSpc>
-              <a:spcBef>
-                <a:spcPts val="0"/>
-              </a:spcBef>
-              <a:spcAft>
-                <a:spcPts val="0"/>
-              </a:spcAft>
-              <a:buClrTx/>
-              <a:buSzTx/>
-              <a:buFontTx/>
-              <a:buNone/>
-              <a:tabLst/>
-              <a:defRPr/>
-            </a:pPr>
-            <a:r>
-              <a:rPr lang="ru-RU" baseline="0" dirty="0" smtClean="0"/>
-              <a:t>Вот мы построили </a:t>
-            </a:r>
-            <a:r>
-              <a:rPr lang="en-US" baseline="0" dirty="0" smtClean="0"/>
-              <a:t>DFD</a:t>
-            </a:r>
-            <a:r>
-              <a:rPr lang="ru-RU" baseline="0" dirty="0" smtClean="0"/>
-              <a:t> диаграммы, выписали все угрозы. Что теперь с этим делать.</a:t>
-            </a:r>
-          </a:p>
-          <a:p>
-            <a:pPr marL="0" marR="0" lvl="0" indent="0" algn="l" defTabSz="1161105" rtl="0" eaLnBrk="1" fontAlgn="auto" latinLnBrk="0" hangingPunct="1">
-              <a:lnSpc>
-                <a:spcPct val="100000"/>
-              </a:lnSpc>
-              <a:spcBef>
-                <a:spcPts val="0"/>
-              </a:spcBef>
-              <a:spcAft>
-                <a:spcPts val="0"/>
-              </a:spcAft>
-              <a:buClrTx/>
-              <a:buSzTx/>
-              <a:buFontTx/>
-              <a:buNone/>
-              <a:tabLst/>
-              <a:defRPr/>
-            </a:pPr>
-            <a:endParaRPr lang="ru-RU" baseline="0" dirty="0" smtClean="0"/>
-          </a:p>
-          <a:p>
-            <a:pPr marL="0" marR="0" lvl="0" indent="0" algn="l" defTabSz="1161105" rtl="0" eaLnBrk="1" fontAlgn="auto" latinLnBrk="0" hangingPunct="1">
-              <a:lnSpc>
-                <a:spcPct val="100000"/>
-              </a:lnSpc>
-              <a:spcBef>
-                <a:spcPts val="0"/>
-              </a:spcBef>
-              <a:spcAft>
-                <a:spcPts val="0"/>
-              </a:spcAft>
-              <a:buClrTx/>
-              <a:buSzTx/>
-              <a:buFontTx/>
-              <a:buNone/>
-              <a:tabLst/>
-              <a:defRPr/>
-            </a:pPr>
-            <a:r>
-              <a:rPr lang="ru-RU" baseline="0" dirty="0" smtClean="0"/>
-              <a:t>В </a:t>
-            </a:r>
-            <a:r>
-              <a:rPr lang="en-US" baseline="0" dirty="0" smtClean="0"/>
-              <a:t>SDL </a:t>
-            </a:r>
-            <a:r>
-              <a:rPr lang="ru-RU" baseline="0" dirty="0" smtClean="0"/>
-              <a:t>есть такое понятие </a:t>
-            </a:r>
-            <a:r>
-              <a:rPr lang="en-US" baseline="0" dirty="0" smtClean="0"/>
-              <a:t>threat mitigation – </a:t>
-            </a:r>
-            <a:r>
-              <a:rPr lang="ru-RU" baseline="0" dirty="0" smtClean="0"/>
-              <a:t>смягчение угрозы.</a:t>
-            </a:r>
-          </a:p>
-          <a:p>
-            <a:pPr marL="0" marR="0" lvl="0" indent="0" algn="l" defTabSz="1161105" rtl="0" eaLnBrk="1" fontAlgn="auto" latinLnBrk="0" hangingPunct="1">
-              <a:lnSpc>
-                <a:spcPct val="100000"/>
-              </a:lnSpc>
-              <a:spcBef>
-                <a:spcPts val="0"/>
-              </a:spcBef>
-              <a:spcAft>
-                <a:spcPts val="0"/>
-              </a:spcAft>
-              <a:buClrTx/>
-              <a:buSzTx/>
-              <a:buFontTx/>
-              <a:buNone/>
-              <a:tabLst/>
-              <a:defRPr/>
-            </a:pPr>
-            <a:r>
-              <a:rPr lang="ru-RU" baseline="0" dirty="0" smtClean="0"/>
-              <a:t>Это такая последовательность действий, которая призвана уменьшить угрозу до приемлемого уровня, или совсем от нее избавиться.</a:t>
-            </a:r>
-          </a:p>
-          <a:p>
-            <a:pPr marL="0" marR="0" lvl="0" indent="0" algn="l" defTabSz="1161105" rtl="0" eaLnBrk="1" fontAlgn="auto" latinLnBrk="0" hangingPunct="1">
-              <a:lnSpc>
-                <a:spcPct val="100000"/>
-              </a:lnSpc>
-              <a:spcBef>
-                <a:spcPts val="0"/>
-              </a:spcBef>
-              <a:spcAft>
-                <a:spcPts val="0"/>
-              </a:spcAft>
-              <a:buClrTx/>
-              <a:buSzTx/>
-              <a:buFontTx/>
-              <a:buNone/>
-              <a:tabLst/>
-              <a:defRPr/>
-            </a:pPr>
-            <a:endParaRPr lang="ru-RU" baseline="0" dirty="0" smtClean="0"/>
-          </a:p>
-          <a:p>
-            <a:pPr marL="0" marR="0" lvl="0" indent="0" algn="l" defTabSz="1161105" rtl="0" eaLnBrk="1" fontAlgn="auto" latinLnBrk="0" hangingPunct="1">
-              <a:lnSpc>
-                <a:spcPct val="100000"/>
-              </a:lnSpc>
-              <a:spcBef>
-                <a:spcPts val="0"/>
-              </a:spcBef>
-              <a:spcAft>
-                <a:spcPts val="0"/>
-              </a:spcAft>
-              <a:buClrTx/>
-              <a:buSzTx/>
-              <a:buFontTx/>
-              <a:buNone/>
-              <a:tabLst/>
-              <a:defRPr/>
-            </a:pPr>
-            <a:r>
-              <a:rPr lang="ru-RU" baseline="0" dirty="0" smtClean="0"/>
-              <a:t>Бывают разные способы </a:t>
-            </a:r>
-            <a:r>
-              <a:rPr lang="ru-RU" baseline="0" dirty="0" err="1" smtClean="0"/>
-              <a:t>митигации</a:t>
-            </a:r>
-            <a:r>
-              <a:rPr lang="ru-RU" baseline="0" dirty="0" smtClean="0"/>
-              <a:t> угроз:</a:t>
-            </a:r>
-          </a:p>
-          <a:p>
-            <a:pPr marL="0" marR="0" lvl="0" indent="0" algn="l" defTabSz="1161105" rtl="0" eaLnBrk="1" fontAlgn="auto" latinLnBrk="0" hangingPunct="1">
-              <a:lnSpc>
-                <a:spcPct val="100000"/>
-              </a:lnSpc>
-              <a:spcBef>
-                <a:spcPts val="0"/>
-              </a:spcBef>
-              <a:spcAft>
-                <a:spcPts val="0"/>
-              </a:spcAft>
-              <a:buClrTx/>
-              <a:buSzTx/>
-              <a:buFontTx/>
-              <a:buNone/>
-              <a:tabLst/>
-              <a:defRPr/>
-            </a:pPr>
-            <a:endParaRPr lang="ru-RU" baseline="0" dirty="0" smtClean="0"/>
-          </a:p>
-          <a:p>
-            <a:pPr marL="342900" marR="0" lvl="0" indent="-342900" algn="l" defTabSz="1161105" rtl="0" eaLnBrk="1" fontAlgn="auto" latinLnBrk="0" hangingPunct="1">
-              <a:lnSpc>
-                <a:spcPct val="100000"/>
-              </a:lnSpc>
-              <a:spcBef>
-                <a:spcPts val="0"/>
-              </a:spcBef>
-              <a:spcAft>
-                <a:spcPts val="0"/>
-              </a:spcAft>
-              <a:buClrTx/>
-              <a:buSzTx/>
-              <a:buFontTx/>
-              <a:buAutoNum type="arabicPeriod"/>
-              <a:tabLst/>
-              <a:defRPr/>
-            </a:pPr>
-            <a:r>
-              <a:rPr lang="ru-RU" baseline="0" dirty="0" smtClean="0"/>
-              <a:t>Например, мы можем на этапе дизайна переработать (или вообще убрать) потоки данных или приложение, так что угроза исчезнет.</a:t>
-            </a:r>
-          </a:p>
-          <a:p>
-            <a:pPr marL="342900" marR="0" lvl="0" indent="-342900" algn="l" defTabSz="1161105" rtl="0" eaLnBrk="1" fontAlgn="auto" latinLnBrk="0" hangingPunct="1">
-              <a:lnSpc>
-                <a:spcPct val="100000"/>
-              </a:lnSpc>
-              <a:spcBef>
-                <a:spcPts val="0"/>
-              </a:spcBef>
-              <a:spcAft>
-                <a:spcPts val="0"/>
-              </a:spcAft>
-              <a:buClrTx/>
-              <a:buSzTx/>
-              <a:buFontTx/>
-              <a:buAutoNum type="arabicPeriod"/>
-              <a:tabLst/>
-              <a:defRPr/>
-            </a:pPr>
-            <a:r>
-              <a:rPr lang="ru-RU" baseline="0" dirty="0" smtClean="0"/>
-              <a:t>Мы можем использовать какую-то стандартную </a:t>
-            </a:r>
-            <a:r>
-              <a:rPr lang="ru-RU" baseline="0" dirty="0" err="1" smtClean="0"/>
-              <a:t>митигацию</a:t>
-            </a:r>
-            <a:r>
-              <a:rPr lang="ru-RU" baseline="0" dirty="0" smtClean="0"/>
-              <a:t> (об этом позже).</a:t>
-            </a:r>
-          </a:p>
-          <a:p>
-            <a:pPr marL="342900" marR="0" lvl="0" indent="-342900" algn="l" defTabSz="1161105" rtl="0" eaLnBrk="1" fontAlgn="auto" latinLnBrk="0" hangingPunct="1">
-              <a:lnSpc>
-                <a:spcPct val="100000"/>
-              </a:lnSpc>
-              <a:spcBef>
-                <a:spcPts val="0"/>
-              </a:spcBef>
-              <a:spcAft>
-                <a:spcPts val="0"/>
-              </a:spcAft>
-              <a:buClrTx/>
-              <a:buSzTx/>
-              <a:buFontTx/>
-              <a:buAutoNum type="arabicPeriod"/>
-              <a:tabLst/>
-              <a:defRPr/>
-            </a:pPr>
-            <a:r>
-              <a:rPr lang="ru-RU" baseline="0" dirty="0" smtClean="0"/>
-              <a:t>Мы можем внести описание угрозы в публичную документацию к нашей программе. Например: внимание, данная программа не обеспечивает конфиденциальности данных. Пожалуйста, используйте другие программы по защите данных, например </a:t>
-            </a:r>
-            <a:r>
-              <a:rPr lang="en-US" baseline="0" dirty="0" err="1" smtClean="0"/>
-              <a:t>GnuPG</a:t>
-            </a:r>
-            <a:r>
-              <a:rPr lang="ru-RU" baseline="0" dirty="0" smtClean="0"/>
-              <a:t>. Или, для того чтобы обезопасить себя от утечки данных, настройте </a:t>
-            </a:r>
-            <a:r>
-              <a:rPr lang="en-US" baseline="0" dirty="0" err="1" smtClean="0"/>
-              <a:t>FireWall</a:t>
-            </a:r>
-            <a:r>
-              <a:rPr lang="ru-RU" baseline="0" dirty="0" smtClean="0"/>
-              <a:t>, так чтобы он блокировал все соединения на порту 8080.</a:t>
-            </a:r>
-          </a:p>
-          <a:p>
-            <a:pPr marL="342900" marR="0" lvl="0" indent="-342900" algn="l" defTabSz="1161105" rtl="0" eaLnBrk="1" fontAlgn="auto" latinLnBrk="0" hangingPunct="1">
-              <a:lnSpc>
-                <a:spcPct val="100000"/>
-              </a:lnSpc>
-              <a:spcBef>
-                <a:spcPts val="0"/>
-              </a:spcBef>
-              <a:spcAft>
-                <a:spcPts val="0"/>
-              </a:spcAft>
-              <a:buClrTx/>
-              <a:buSzTx/>
-              <a:buFontTx/>
-              <a:buAutoNum type="arabicPeriod"/>
-              <a:tabLst/>
-              <a:defRPr/>
-            </a:pPr>
-            <a:endParaRPr lang="ru-RU" baseline="0" dirty="0" smtClean="0"/>
-          </a:p>
-        </p:txBody>
-      </p:sp>
-      <p:sp>
-        <p:nvSpPr>
-          <p:cNvPr id="4" name="Номер слайда 3"/>
+              <a:rPr lang="ru-RU" dirty="0" err="1"/>
+              <a:t>Дискас</a:t>
+            </a:r>
+            <a:r>
+              <a:rPr lang="ru-RU" dirty="0"/>
+              <a:t>!</a:t>
+            </a:r>
+          </a:p>
+        </p:txBody>
+      </p:sp>
+      <p:sp>
+        <p:nvSpPr>
+          <p:cNvPr id="4" name="Slide Number Placeholder 3"/>
           <p:cNvSpPr>
             <a:spLocks noGrp="1"/>
           </p:cNvSpPr>
@@ -3302,18 +3191,26 @@
           <a:lstStyle/>
           <a:p>
             <a:fld id="{83FDD216-B18C-4F7A-91C3-E6C7F0FB2278}" type="slidenum">
-              <a:rPr lang="ru-RU" smtClean="0"/>
+              <a:rPr lang="ru-RU" smtClean="0">
+                <a:solidFill>
+                  <a:prstClr val="black"/>
+                </a:solidFill>
+              </a:rPr>
               <a:pPr/>
               <a:t>20</a:t>
             </a:fld>
-            <a:endParaRPr lang="ru-RU" dirty="0"/>
+            <a:endParaRPr lang="ru-RU">
+              <a:solidFill>
+                <a:prstClr val="black"/>
+              </a:solidFill>
+            </a:endParaRPr>
           </a:p>
         </p:txBody>
       </p:sp>
     </p:spTree>
     <p:extLst>
       <p:ext uri="{BB962C8B-B14F-4D97-AF65-F5344CB8AC3E}">
-        <p14:creationId xmlns:p14="http://schemas.microsoft.com/office/powerpoint/2010/main" val="2840477499"/>
+        <p14:creationId xmlns:p14="http://schemas.microsoft.com/office/powerpoint/2010/main" val="2147510594"/>
       </p:ext>
     </p:extLst>
   </p:cSld>
@@ -3367,40 +3264,7 @@
           <a:bodyPr/>
           <a:lstStyle/>
           <a:p>
-            <a:pPr marL="0" marR="0" lvl="0" indent="0" algn="l" defTabSz="1161105" rtl="0" eaLnBrk="1" fontAlgn="auto" latinLnBrk="0" hangingPunct="1">
-              <a:lnSpc>
-                <a:spcPct val="100000"/>
-              </a:lnSpc>
-              <a:spcBef>
-                <a:spcPts val="0"/>
-              </a:spcBef>
-              <a:spcAft>
-                <a:spcPts val="0"/>
-              </a:spcAft>
-              <a:buClrTx/>
-              <a:buSzTx/>
-              <a:buFontTx/>
-              <a:buNone/>
-              <a:tabLst/>
-              <a:defRPr/>
-            </a:pPr>
-            <a:r>
-              <a:rPr lang="ru-RU" baseline="0" dirty="0" smtClean="0"/>
-              <a:t>Здесь представлены стандартные варианты </a:t>
-            </a:r>
-            <a:r>
-              <a:rPr lang="ru-RU" baseline="0" dirty="0" err="1" smtClean="0"/>
-              <a:t>митигации</a:t>
-            </a:r>
-            <a:r>
-              <a:rPr lang="ru-RU" baseline="0" dirty="0" smtClean="0"/>
-              <a:t> </a:t>
-            </a:r>
-            <a:r>
-              <a:rPr lang="ru-RU" baseline="0" smtClean="0"/>
-              <a:t>угроз.</a:t>
-            </a:r>
-            <a:endParaRPr lang="en-US" baseline="0" dirty="0" smtClean="0"/>
+            <a:endParaRPr lang="en-US" baseline="0" dirty="0"/>
           </a:p>
         </p:txBody>
       </p:sp>
@@ -3431,7 +3295,7 @@
     </p:spTree>
     <p:extLst>
       <p:ext uri="{BB962C8B-B14F-4D97-AF65-F5344CB8AC3E}">
-        <p14:creationId xmlns:p14="http://schemas.microsoft.com/office/powerpoint/2010/main" val="1112912105"/>
+        <p14:creationId xmlns:p14="http://schemas.microsoft.com/office/powerpoint/2010/main" val="3131211651"/>
       </p:ext>
     </p:extLst>
   </p:cSld>
@@ -3460,7 +3324,7 @@
       </p:grpSpPr>
       <p:sp>
         <p:nvSpPr>
-          <p:cNvPr id="2" name="Slide Image Placeholder 1"/>
+          <p:cNvPr id="2" name="Образ слайда 1"/>
           <p:cNvSpPr>
             <a:spLocks noGrp="1" noRot="1" noChangeAspect="1"/>
           </p:cNvSpPr>
@@ -3472,7 +3336,7 @@
       </p:sp>
       <p:sp>
         <p:nvSpPr>
-          <p:cNvPr id="3" name="Notes Placeholder 2"/>
+          <p:cNvPr id="3" name="Заметки 2"/>
           <p:cNvSpPr>
             <a:spLocks noGrp="1"/>
           </p:cNvSpPr>
@@ -3485,37 +3349,13 @@
           <a:bodyPr/>
           <a:lstStyle/>
           <a:p>
-            <a:pPr marL="0" marR="0" indent="0" algn="l" defTabSz="1161105" rtl="0" eaLnBrk="1" fontAlgn="auto" latinLnBrk="0" hangingPunct="1">
-              <a:lnSpc>
-                <a:spcPct val="100000"/>
-              </a:lnSpc>
-              <a:spcBef>
-                <a:spcPts val="0"/>
-              </a:spcBef>
-              <a:spcAft>
-                <a:spcPts val="0"/>
-              </a:spcAft>
-              <a:buClrTx/>
-              <a:buSzTx/>
-              <a:buFontTx/>
-              <a:buNone/>
-              <a:tabLst/>
-              <a:defRPr/>
-            </a:pPr>
-            <a:r>
-              <a:rPr lang="ru-RU" dirty="0" err="1"/>
-              <a:t>Дискас</a:t>
-            </a:r>
-            <a:r>
-              <a:rPr lang="ru-RU" dirty="0"/>
-              <a:t>!</a:t>
-            </a:r>
-          </a:p>
-        </p:txBody>
-      </p:sp>
-      <p:sp>
-        <p:nvSpPr>
-          <p:cNvPr id="4" name="Slide Number Placeholder 3"/>
+            <a:endParaRPr lang="ru-RU" baseline="0" dirty="0" smtClean="0"/>
+          </a:p>
+        </p:txBody>
+      </p:sp>
+      <p:sp>
+        <p:nvSpPr>
+          <p:cNvPr id="4" name="Номер слайда 3"/>
           <p:cNvSpPr>
             <a:spLocks noGrp="1"/>
           </p:cNvSpPr>
@@ -3529,26 +3369,18 @@
           <a:lstStyle/>
           <a:p>
             <a:fld id="{83FDD216-B18C-4F7A-91C3-E6C7F0FB2278}" type="slidenum">
-              <a:rPr lang="ru-RU" smtClean="0">
-                <a:solidFill>
-                  <a:prstClr val="black"/>
-                </a:solidFill>
-              </a:rPr>
+              <a:rPr lang="ru-RU" smtClean="0"/>
               <a:pPr/>
               <a:t>22</a:t>
             </a:fld>
-            <a:endParaRPr lang="ru-RU">
-              <a:solidFill>
-                <a:prstClr val="black"/>
-              </a:solidFill>
-            </a:endParaRPr>
+            <a:endParaRPr lang="ru-RU" dirty="0"/>
           </a:p>
         </p:txBody>
       </p:sp>
     </p:spTree>
     <p:extLst>
       <p:ext uri="{BB962C8B-B14F-4D97-AF65-F5344CB8AC3E}">
-        <p14:creationId xmlns:p14="http://schemas.microsoft.com/office/powerpoint/2010/main" val="2147510594"/>
+        <p14:creationId xmlns:p14="http://schemas.microsoft.com/office/powerpoint/2010/main" val="2445790166"/>
       </p:ext>
     </p:extLst>
   </p:cSld>
@@ -3602,7 +3434,7 @@
           <a:bodyPr/>
           <a:lstStyle/>
           <a:p>
-            <a:endParaRPr lang="en-US" baseline="0" dirty="0"/>
+            <a:endParaRPr lang="ru-RU" baseline="0" dirty="0" smtClean="0"/>
           </a:p>
         </p:txBody>
       </p:sp>
@@ -3633,7 +3465,7 @@
     </p:spTree>
     <p:extLst>
       <p:ext uri="{BB962C8B-B14F-4D97-AF65-F5344CB8AC3E}">
-        <p14:creationId xmlns:p14="http://schemas.microsoft.com/office/powerpoint/2010/main" val="3131211651"/>
+        <p14:creationId xmlns:p14="http://schemas.microsoft.com/office/powerpoint/2010/main" val="3518859395"/>
       </p:ext>
     </p:extLst>
   </p:cSld>
@@ -3718,7 +3550,7 @@
     </p:spTree>
     <p:extLst>
       <p:ext uri="{BB962C8B-B14F-4D97-AF65-F5344CB8AC3E}">
-        <p14:creationId xmlns:p14="http://schemas.microsoft.com/office/powerpoint/2010/main" val="2445790166"/>
+        <p14:creationId xmlns:p14="http://schemas.microsoft.com/office/powerpoint/2010/main" val="1113396651"/>
       </p:ext>
     </p:extLst>
   </p:cSld>
@@ -3772,176 +3604,6 @@
           <a:bodyPr/>
           <a:lstStyle/>
           <a:p>
-            <a:endParaRPr lang="ru-RU" baseline="0" dirty="0" smtClean="0"/>
-          </a:p>
-        </p:txBody>
-      </p:sp>
-      <p:sp>
-        <p:nvSpPr>
-          <p:cNvPr id="4" name="Номер слайда 3"/>
-          <p:cNvSpPr>
-            <a:spLocks noGrp="1"/>
-          </p:cNvSpPr>
-          <p:nvPr>
-            <p:ph type="sldNum" sz="quarter" idx="10"/>
-          </p:nvPr>
-        </p:nvSpPr>
-        <p:spPr/>
-        <p:txBody>
-          <a:bodyPr/>
-          <a:lstStyle/>
-          <a:p>
-            <a:fld id="{83FDD216-B18C-4F7A-91C3-E6C7F0FB2278}" type="slidenum">
-              <a:rPr lang="ru-RU" smtClean="0"/>
-              <a:pPr/>
-              <a:t>25</a:t>
-            </a:fld>
-            <a:endParaRPr lang="ru-RU" dirty="0"/>
-          </a:p>
-        </p:txBody>
-      </p:sp>
-    </p:spTree>
-    <p:extLst>
-      <p:ext uri="{BB962C8B-B14F-4D97-AF65-F5344CB8AC3E}">
-        <p14:creationId xmlns:p14="http://schemas.microsoft.com/office/powerpoint/2010/main" val="3518859395"/>
-      </p:ext>
-    </p:extLst>
-  </p:cSld>
-  <p:clrMapOvr>
-    <a:masterClrMapping/>
-  </p:clrMapOvr>
-</p:notes>
-</file>
-
-<file path=ppt/notesSlides/notesSlide26.xml><?xml version="1.0" encoding="utf-8"?>
-<p:notes xmlns:a="http://schemas.openxmlformats.org/drawingml/2006/main" xmlns:r="http://schemas.openxmlformats.org/officeDocument/2006/relationships" xmlns:p="http://schemas.openxmlformats.org/presentationml/2006/main">
-  <p:cSld>
-    <p:spTree>
-      <p:nvGrpSpPr>
-        <p:cNvPr id="1" name=""/>
-        <p:cNvGrpSpPr/>
-        <p:nvPr/>
-      </p:nvGrpSpPr>
-      <p:grpSpPr>
-        <a:xfrm>
-          <a:off x="0" y="0"/>
-          <a:ext cx="0" cy="0"/>
-          <a:chOff x="0" y="0"/>
-          <a:chExt cx="0" cy="0"/>
-        </a:xfrm>
-      </p:grpSpPr>
-      <p:sp>
-        <p:nvSpPr>
-          <p:cNvPr id="2" name="Образ слайда 1"/>
-          <p:cNvSpPr>
-            <a:spLocks noGrp="1" noRot="1" noChangeAspect="1"/>
-          </p:cNvSpPr>
-          <p:nvPr>
-            <p:ph type="sldImg"/>
-          </p:nvPr>
-        </p:nvSpPr>
-        <p:spPr/>
-      </p:sp>
-      <p:sp>
-        <p:nvSpPr>
-          <p:cNvPr id="3" name="Заметки 2"/>
-          <p:cNvSpPr>
-            <a:spLocks noGrp="1"/>
-          </p:cNvSpPr>
-          <p:nvPr>
-            <p:ph type="body" idx="1"/>
-          </p:nvPr>
-        </p:nvSpPr>
-        <p:spPr/>
-        <p:txBody>
-          <a:bodyPr/>
-          <a:lstStyle/>
-          <a:p>
-            <a:endParaRPr lang="ru-RU" baseline="0" dirty="0" smtClean="0"/>
-          </a:p>
-        </p:txBody>
-      </p:sp>
-      <p:sp>
-        <p:nvSpPr>
-          <p:cNvPr id="4" name="Номер слайда 3"/>
-          <p:cNvSpPr>
-            <a:spLocks noGrp="1"/>
-          </p:cNvSpPr>
-          <p:nvPr>
-            <p:ph type="sldNum" sz="quarter" idx="10"/>
-          </p:nvPr>
-        </p:nvSpPr>
-        <p:spPr/>
-        <p:txBody>
-          <a:bodyPr/>
-          <a:lstStyle/>
-          <a:p>
-            <a:fld id="{83FDD216-B18C-4F7A-91C3-E6C7F0FB2278}" type="slidenum">
-              <a:rPr lang="ru-RU" smtClean="0"/>
-              <a:pPr/>
-              <a:t>26</a:t>
-            </a:fld>
-            <a:endParaRPr lang="ru-RU" dirty="0"/>
-          </a:p>
-        </p:txBody>
-      </p:sp>
-    </p:spTree>
-    <p:extLst>
-      <p:ext uri="{BB962C8B-B14F-4D97-AF65-F5344CB8AC3E}">
-        <p14:creationId xmlns:p14="http://schemas.microsoft.com/office/powerpoint/2010/main" val="1113396651"/>
-      </p:ext>
-    </p:extLst>
-  </p:cSld>
-  <p:clrMapOvr>
-    <a:masterClrMapping/>
-  </p:clrMapOvr>
-</p:notes>
-</file>
-
-<file path=ppt/notesSlides/notesSlide27.xml><?xml version="1.0" encoding="utf-8"?>
-<p:notes xmlns:a="http://schemas.openxmlformats.org/drawingml/2006/main" xmlns:r="http://schemas.openxmlformats.org/officeDocument/2006/relationships" xmlns:p="http://schemas.openxmlformats.org/presentationml/2006/main">
-  <p:cSld>
-    <p:spTree>
-      <p:nvGrpSpPr>
-        <p:cNvPr id="1" name=""/>
-        <p:cNvGrpSpPr/>
-        <p:nvPr/>
-      </p:nvGrpSpPr>
-      <p:grpSpPr>
-        <a:xfrm>
-          <a:off x="0" y="0"/>
-          <a:ext cx="0" cy="0"/>
-          <a:chOff x="0" y="0"/>
-          <a:chExt cx="0" cy="0"/>
-        </a:xfrm>
-      </p:grpSpPr>
-      <p:sp>
-        <p:nvSpPr>
-          <p:cNvPr id="2" name="Образ слайда 1"/>
-          <p:cNvSpPr>
-            <a:spLocks noGrp="1" noRot="1" noChangeAspect="1"/>
-          </p:cNvSpPr>
-          <p:nvPr>
-            <p:ph type="sldImg"/>
-          </p:nvPr>
-        </p:nvSpPr>
-        <p:spPr/>
-      </p:sp>
-      <p:sp>
-        <p:nvSpPr>
-          <p:cNvPr id="3" name="Заметки 2"/>
-          <p:cNvSpPr>
-            <a:spLocks noGrp="1"/>
-          </p:cNvSpPr>
-          <p:nvPr>
-            <p:ph type="body" idx="1"/>
-          </p:nvPr>
-        </p:nvSpPr>
-        <p:spPr/>
-        <p:txBody>
-          <a:bodyPr/>
-          <a:lstStyle/>
-          <a:p>
             <a:pPr marL="0" marR="0" lvl="0" indent="0" algn="l" defTabSz="1161105" rtl="0" eaLnBrk="1" fontAlgn="auto" latinLnBrk="0" hangingPunct="1">
               <a:lnSpc>
                 <a:spcPct val="100000"/>
@@ -3981,7 +3643,7 @@
             <a:fld id="{83FDD216-B18C-4F7A-91C3-E6C7F0FB2278}" type="slidenum">
               <a:rPr lang="ru-RU" smtClean="0"/>
               <a:pPr/>
-              <a:t>27</a:t>
+              <a:t>25</a:t>
             </a:fld>
             <a:endParaRPr lang="ru-RU" dirty="0"/>
           </a:p>
@@ -4353,25 +4015,13 @@
             </a:pPr>
             <a:r>
               <a:rPr lang="ru-RU" baseline="0" dirty="0" smtClean="0"/>
-              <a:t>Наоборот, все пункты равнозначны, и все они должны быть рассмотрены с учетом влияния других пунктов. Ну кроме быть может последнего пункта. Он формируется обычно в конце, когда мы все учли, но не можем реализовать требование по каким-то причинам. Например, реализация алгоритма, требует больше 4</a:t>
-            </a:r>
-            <a:r>
-              <a:rPr lang="en-US" baseline="0" dirty="0" smtClean="0"/>
-              <a:t>G</a:t>
+              <a:t>Наоборот, все пункты равнозначны, и все они должны быть рассмотрены с учетом влияния других пунктов</a:t>
             </a:r>
             <a:r>
               <a:rPr lang="ru-RU" baseline="0" dirty="0" smtClean="0"/>
-              <a:t> памяти, а сторонняя библиотека может работать только в 32-х битном режиме.</a:t>
-            </a:r>
-          </a:p>
-          <a:p>
-            <a:pPr marL="0" indent="0">
-              <a:buNone/>
-            </a:pPr>
-            <a:r>
-              <a:rPr lang="ru-RU" baseline="0" dirty="0" smtClean="0"/>
-              <a:t>Переделка библиотеки под 64 бита потребует существенных доработок. И т.д.</a:t>
-            </a:r>
+              <a:t>.</a:t>
+            </a:r>
+            <a:endParaRPr lang="en-US" baseline="0" dirty="0" smtClean="0"/>
           </a:p>
           <a:p>
             <a:pPr marL="0" indent="0">
@@ -4686,9 +4336,106 @@
               <a:t>threat modelling</a:t>
             </a:r>
             <a:r>
-              <a:rPr lang="ru-RU" baseline="0" smtClean="0"/>
-              <a:t> – моделирование угроз.</a:t>
-            </a:r>
+              <a:rPr lang="ru-RU" baseline="0" dirty="0" smtClean="0"/>
+              <a:t> – моделирование угроз</a:t>
+            </a:r>
+            <a:r>
+              <a:rPr lang="ru-RU" baseline="0" dirty="0" smtClean="0"/>
+              <a:t>.</a:t>
+            </a:r>
+            <a:endParaRPr lang="en-US" baseline="0" dirty="0" smtClean="0"/>
+          </a:p>
+          <a:p>
+            <a:pPr marL="0" marR="0" lvl="0" indent="0" algn="l" defTabSz="1161105" rtl="0" eaLnBrk="1" fontAlgn="auto" latinLnBrk="0" hangingPunct="1">
+              <a:lnSpc>
+                <a:spcPct val="100000"/>
+              </a:lnSpc>
+              <a:spcBef>
+                <a:spcPts val="0"/>
+              </a:spcBef>
+              <a:spcAft>
+                <a:spcPts val="0"/>
+              </a:spcAft>
+              <a:buClrTx/>
+              <a:buSzTx/>
+              <a:buFontTx/>
+              <a:buNone/>
+              <a:tabLst/>
+              <a:defRPr/>
+            </a:pPr>
+            <a:endParaRPr lang="en-US" baseline="0" dirty="0" smtClean="0"/>
+          </a:p>
+          <a:p>
+            <a:r>
+              <a:rPr lang="ru-RU" baseline="0" dirty="0" smtClean="0"/>
+              <a:t>Кто знает что такое угроза?</a:t>
+            </a:r>
+          </a:p>
+          <a:p>
+            <a:r>
+              <a:rPr lang="ru-RU" baseline="0" dirty="0" smtClean="0"/>
+              <a:t>Угроза – это то что угрожает штатному поведению системы. Угроза может привести к различным проблемам, а может и не привести.</a:t>
+            </a:r>
+          </a:p>
+          <a:p>
+            <a:pPr marL="0" marR="0" lvl="0" indent="0" algn="l" defTabSz="1161105" rtl="0" eaLnBrk="1" fontAlgn="auto" latinLnBrk="0" hangingPunct="1">
+              <a:lnSpc>
+                <a:spcPct val="100000"/>
+              </a:lnSpc>
+              <a:spcBef>
+                <a:spcPts val="0"/>
+              </a:spcBef>
+              <a:spcAft>
+                <a:spcPts val="0"/>
+              </a:spcAft>
+              <a:buClrTx/>
+              <a:buSzTx/>
+              <a:buFontTx/>
+              <a:buNone/>
+              <a:tabLst/>
+              <a:defRPr/>
+            </a:pPr>
+            <a:r>
+              <a:rPr lang="ru-RU" baseline="0" dirty="0" smtClean="0"/>
+              <a:t>Тут важно понимать, что угроза может возникнуть из-за того, что на этапе проектирования не учли эту угрозу, так и из-за банального бага в реализации.</a:t>
+            </a:r>
+            <a:r>
+              <a:rPr lang="en-US" baseline="0" dirty="0" smtClean="0"/>
+              <a:t> </a:t>
+            </a:r>
+            <a:r>
+              <a:rPr lang="ru-RU" baseline="0" dirty="0" smtClean="0"/>
+              <a:t>Кроме того, одна угроза, сама по себе может не приносить вреда, однако в сочетании с другими угрозами это может перерасти в настоящую уязвимость.</a:t>
+            </a:r>
+          </a:p>
+          <a:p>
+            <a:endParaRPr lang="ru-RU" baseline="0" dirty="0" smtClean="0"/>
+          </a:p>
+          <a:p>
+            <a:r>
+              <a:rPr lang="ru-RU" baseline="0" dirty="0" smtClean="0"/>
+              <a:t>Давайте обсудим, какие виды угроз бывают, как они классифицируются.</a:t>
+            </a:r>
+          </a:p>
+          <a:p>
+            <a:pPr marL="0" marR="0" lvl="0" indent="0" algn="l" defTabSz="1161105" rtl="0" eaLnBrk="1" fontAlgn="auto" latinLnBrk="0" hangingPunct="1">
+              <a:lnSpc>
+                <a:spcPct val="100000"/>
+              </a:lnSpc>
+              <a:spcBef>
+                <a:spcPts val="0"/>
+              </a:spcBef>
+              <a:spcAft>
+                <a:spcPts val="0"/>
+              </a:spcAft>
+              <a:buClrTx/>
+              <a:buSzTx/>
+              <a:buFontTx/>
+              <a:buNone/>
+              <a:tabLst/>
+              <a:defRPr/>
+            </a:pPr>
+            <a:endParaRPr lang="ru-RU" baseline="0" dirty="0" smtClean="0"/>
           </a:p>
         </p:txBody>
       </p:sp>
@@ -4774,54 +4521,60 @@
           <a:lstStyle/>
           <a:p>
             <a:r>
+              <a:rPr lang="en-US" baseline="0" dirty="0" smtClean="0"/>
+              <a:t>SDL</a:t>
+            </a:r>
+            <a:r>
               <a:rPr lang="ru-RU" baseline="0" dirty="0" smtClean="0"/>
-              <a:t>На самом деле два остальных пункта тоже относятся к </a:t>
+              <a:t> оперирует 6-ю видами угроз. Их названия формируют акроним </a:t>
             </a:r>
             <a:r>
               <a:rPr lang="en-US" baseline="0" dirty="0" smtClean="0"/>
-              <a:t>threat modelling</a:t>
-            </a:r>
+              <a:t>STRIDE.</a:t>
+            </a:r>
+          </a:p>
+          <a:p>
             <a:r>
               <a:rPr lang="ru-RU" baseline="0" dirty="0" smtClean="0"/>
-              <a:t>, но они сами по себе являются довольно важными, поэтому я их вынес.</a:t>
+              <a:t>Вот они здесь перечислены. Давайте по каждой из них пройдемся</a:t>
+            </a:r>
+            <a:endParaRPr lang="en-US" baseline="0" dirty="0" smtClean="0"/>
+          </a:p>
+          <a:p>
+            <a:endParaRPr lang="en-US" baseline="0" dirty="0" smtClean="0"/>
+          </a:p>
+          <a:p>
+            <a:endParaRPr lang="en-US" baseline="0" dirty="0" smtClean="0"/>
+          </a:p>
+          <a:p>
+            <a:r>
+              <a:rPr lang="ru-RU" baseline="0" dirty="0" smtClean="0"/>
+              <a:t>В таблице приведены все угрозы с точки зрения </a:t>
+            </a:r>
+            <a:r>
+              <a:rPr lang="en-US" baseline="0" dirty="0" smtClean="0"/>
+              <a:t>SDL</a:t>
+            </a:r>
+            <a:r>
+              <a:rPr lang="ru-RU" baseline="0" dirty="0" smtClean="0"/>
+              <a:t>, а также необходимые свойства компоненты, позволяющие избежать конкретной угрозы.</a:t>
+            </a:r>
+            <a:endParaRPr lang="en-US" baseline="0" dirty="0" smtClean="0"/>
+          </a:p>
+          <a:p>
+            <a:endParaRPr lang="en-US" baseline="0" dirty="0" smtClean="0"/>
+          </a:p>
+          <a:p>
+            <a:r>
+              <a:rPr lang="ru-RU" baseline="0" dirty="0" smtClean="0"/>
+              <a:t>Теперь мы обсудим каждую угрозу более детально</a:t>
             </a:r>
           </a:p>
           <a:p>
             <a:endParaRPr lang="ru-RU" baseline="0" dirty="0" smtClean="0"/>
           </a:p>
           <a:p>
-            <a:r>
-              <a:rPr lang="ru-RU" baseline="0" dirty="0" smtClean="0"/>
-              <a:t>Итак</a:t>
-            </a:r>
-            <a:r>
-              <a:rPr lang="en-US" baseline="0" dirty="0" smtClean="0"/>
-              <a:t> – threat modelling – </a:t>
-            </a:r>
-            <a:r>
-              <a:rPr lang="ru-RU" baseline="0" dirty="0" smtClean="0"/>
-              <a:t>моделирование угроз на этом этапе мы будем пытаться выявить угрозы.</a:t>
-            </a:r>
-          </a:p>
-          <a:p>
-            <a:r>
-              <a:rPr lang="en-US" baseline="0" dirty="0" smtClean="0"/>
-              <a:t>Data flow diagram – </a:t>
-            </a:r>
-            <a:r>
-              <a:rPr lang="ru-RU" baseline="0" dirty="0" smtClean="0"/>
-              <a:t>это наглядный способ выявить угрозы</a:t>
-            </a:r>
-          </a:p>
-          <a:p>
-            <a:r>
-              <a:rPr lang="en-US" baseline="0" dirty="0" smtClean="0"/>
-              <a:t>Threat mitigations</a:t>
-            </a:r>
-            <a:r>
-              <a:rPr lang="ru-RU" baseline="0" dirty="0" smtClean="0"/>
-              <a:t> – это способы избавления или уменьшения угроз.</a:t>
-            </a:r>
+            <a:endParaRPr lang="ru-RU" baseline="0" dirty="0" smtClean="0"/>
           </a:p>
         </p:txBody>
       </p:sp>
@@ -4852,7 +4605,7 @@
     </p:spTree>
     <p:extLst>
       <p:ext uri="{BB962C8B-B14F-4D97-AF65-F5344CB8AC3E}">
-        <p14:creationId xmlns:p14="http://schemas.microsoft.com/office/powerpoint/2010/main" val="60959060"/>
+        <p14:creationId xmlns:p14="http://schemas.microsoft.com/office/powerpoint/2010/main" val="314644239"/>
       </p:ext>
     </p:extLst>
   </p:cSld>
@@ -4908,130 +4661,65 @@
           <a:p>
             <a:r>
               <a:rPr lang="ru-RU" baseline="0" dirty="0" smtClean="0"/>
-              <a:t>Одной из частей </a:t>
+              <a:t>Итак, </a:t>
             </a:r>
             <a:r>
               <a:rPr lang="en-US" baseline="0" dirty="0" smtClean="0"/>
-              <a:t>SDL</a:t>
+              <a:t>spoofing</a:t>
+            </a:r>
+            <a:r>
+              <a:rPr lang="ru-RU" baseline="0" dirty="0" smtClean="0"/>
+              <a:t> – процесс подмены пользователя или программы.</a:t>
+            </a:r>
+          </a:p>
+          <a:p>
+            <a:endParaRPr lang="ru-RU" baseline="0" dirty="0" smtClean="0"/>
+          </a:p>
+          <a:p>
+            <a:r>
+              <a:rPr lang="ru-RU" baseline="0" dirty="0" smtClean="0"/>
+              <a:t>Эта атака возникает в том случае, если нет механизма проверки подлинности (аутентификации).</a:t>
+            </a:r>
+          </a:p>
+          <a:p>
+            <a:endParaRPr lang="ru-RU" baseline="0" dirty="0" smtClean="0"/>
+          </a:p>
+          <a:p>
+            <a:r>
+              <a:rPr lang="ru-RU" baseline="0" dirty="0" smtClean="0"/>
+              <a:t>Например, </a:t>
+            </a:r>
+            <a:r>
+              <a:rPr lang="ru-RU" baseline="0" dirty="0" err="1" smtClean="0"/>
+              <a:t>спуфинг</a:t>
             </a:r>
             <a:r>
               <a:rPr lang="ru-RU" baseline="0" dirty="0" smtClean="0"/>
               <a:t> </a:t>
             </a:r>
             <a:r>
+              <a:rPr lang="en-US" baseline="0" dirty="0" smtClean="0"/>
+              <a:t>e-mail:</a:t>
+            </a:r>
+          </a:p>
+          <a:p>
+            <a:endParaRPr lang="en-US" baseline="0" dirty="0" smtClean="0"/>
+          </a:p>
+          <a:p>
+            <a:r>
               <a:rPr lang="ru-RU" baseline="0" dirty="0" smtClean="0"/>
-              <a:t>как раз является </a:t>
+              <a:t>В </a:t>
             </a:r>
             <a:r>
               <a:rPr lang="en-US" baseline="0" dirty="0" smtClean="0"/>
-              <a:t>threat modelling – </a:t>
+              <a:t>e-mail</a:t>
             </a:r>
             <a:r>
               <a:rPr lang="ru-RU" baseline="0" dirty="0" smtClean="0"/>
-              <a:t>моделирование угроз.</a:t>
-            </a:r>
-          </a:p>
-          <a:p>
-            <a:endParaRPr lang="ru-RU" baseline="0" dirty="0" smtClean="0"/>
-          </a:p>
-          <a:p>
-            <a:r>
-              <a:rPr lang="ru-RU" baseline="0" dirty="0" smtClean="0"/>
-              <a:t>Кто знает что такое угроза?</a:t>
-            </a:r>
-          </a:p>
-          <a:p>
-            <a:r>
-              <a:rPr lang="ru-RU" baseline="0" dirty="0" smtClean="0"/>
-              <a:t>Угроза – это то что угрожает штатному поведению системы. Угроза может привести к различным проблемам, а может и не привести</a:t>
-            </a:r>
-            <a:r>
-              <a:rPr lang="ru-RU" baseline="0" dirty="0" smtClean="0"/>
-              <a:t>.</a:t>
-            </a:r>
-          </a:p>
-          <a:p>
-            <a:pPr marL="0" marR="0" lvl="0" indent="0" algn="l" defTabSz="1161105" rtl="0" eaLnBrk="1" fontAlgn="auto" latinLnBrk="0" hangingPunct="1">
-              <a:lnSpc>
-                <a:spcPct val="100000"/>
-              </a:lnSpc>
-              <a:spcBef>
-                <a:spcPts val="0"/>
-              </a:spcBef>
-              <a:spcAft>
-                <a:spcPts val="0"/>
-              </a:spcAft>
-              <a:buClrTx/>
-              <a:buSzTx/>
-              <a:buFontTx/>
-              <a:buNone/>
-              <a:tabLst/>
-              <a:defRPr/>
-            </a:pPr>
-            <a:r>
-              <a:rPr lang="ru-RU" baseline="0" dirty="0" smtClean="0"/>
-              <a:t>Тут важно понимать, что угроза может возникнуть из-за того, что на этапе проектирования не учли эту угрозу, так и из-за банального бага в реализации.</a:t>
-            </a:r>
-          </a:p>
-          <a:p>
-            <a:pPr marL="0" marR="0" lvl="0" indent="0" algn="l" defTabSz="1161105" rtl="0" eaLnBrk="1" fontAlgn="auto" latinLnBrk="0" hangingPunct="1">
-              <a:lnSpc>
-                <a:spcPct val="100000"/>
-              </a:lnSpc>
-              <a:spcBef>
-                <a:spcPts val="0"/>
-              </a:spcBef>
-              <a:spcAft>
-                <a:spcPts val="0"/>
-              </a:spcAft>
-              <a:buClrTx/>
-              <a:buSzTx/>
-              <a:buFontTx/>
-              <a:buNone/>
-              <a:tabLst/>
-              <a:defRPr/>
-            </a:pPr>
-            <a:endParaRPr lang="ru-RU" baseline="0" dirty="0" smtClean="0"/>
-          </a:p>
-          <a:p>
-            <a:pPr marL="0" marR="0" lvl="0" indent="0" algn="l" defTabSz="1161105" rtl="0" eaLnBrk="1" fontAlgn="auto" latinLnBrk="0" hangingPunct="1">
-              <a:lnSpc>
-                <a:spcPct val="100000"/>
-              </a:lnSpc>
-              <a:spcBef>
-                <a:spcPts val="0"/>
-              </a:spcBef>
-              <a:spcAft>
-                <a:spcPts val="0"/>
-              </a:spcAft>
-              <a:buClrTx/>
-              <a:buSzTx/>
-              <a:buFontTx/>
-              <a:buNone/>
-              <a:tabLst/>
-              <a:defRPr/>
-            </a:pPr>
-            <a:r>
-              <a:rPr lang="ru-RU" baseline="0" dirty="0" smtClean="0"/>
-              <a:t>Кроме того, одна угроза, сама по себе может не приносить вреда, однако в сочетании с другими угрозами это может перерасти в настоящую уязвимость.</a:t>
-            </a:r>
-          </a:p>
-          <a:p>
-            <a:endParaRPr lang="ru-RU" baseline="0" dirty="0" smtClean="0"/>
-          </a:p>
-          <a:p>
-            <a:r>
-              <a:rPr lang="ru-RU" baseline="0" dirty="0" smtClean="0"/>
-              <a:t>Давайте </a:t>
-            </a:r>
-            <a:r>
-              <a:rPr lang="ru-RU" baseline="0" dirty="0" smtClean="0"/>
-              <a:t>обсудим, какие виды угроз бывают, как они классифицируются</a:t>
-            </a:r>
-            <a:r>
-              <a:rPr lang="ru-RU" baseline="0" dirty="0" smtClean="0"/>
-              <a:t>.</a:t>
-            </a:r>
+              <a:t> есть поле «отправитель», эту информацию можно легко подделать. Если пользователь ответит на такое письмо, то оно будет доставлено злоумышленнику вместо легитимного пользователя.</a:t>
+            </a:r>
+          </a:p>
+          <a:p>
             <a:endParaRPr lang="ru-RU" baseline="0" dirty="0" smtClean="0"/>
           </a:p>
         </p:txBody>
@@ -5063,7 +4751,7 @@
     </p:spTree>
     <p:extLst>
       <p:ext uri="{BB962C8B-B14F-4D97-AF65-F5344CB8AC3E}">
-        <p14:creationId xmlns:p14="http://schemas.microsoft.com/office/powerpoint/2010/main" val="3442518557"/>
+        <p14:creationId xmlns:p14="http://schemas.microsoft.com/office/powerpoint/2010/main" val="1574545940"/>
       </p:ext>
     </p:extLst>
   </p:cSld>
@@ -5119,64 +4807,69 @@
           <a:p>
             <a:r>
               <a:rPr lang="en-US" baseline="0" dirty="0" smtClean="0"/>
-              <a:t>SDL</a:t>
+              <a:t>Tampering</a:t>
             </a:r>
             <a:r>
               <a:rPr lang="ru-RU" baseline="0" dirty="0" smtClean="0"/>
-              <a:t> оперирует 6-ю видами угроз. Их названия формируют акроним </a:t>
+              <a:t> – процесс подмены данных, или же процесс подмены исполняемого файла.</a:t>
+            </a:r>
+          </a:p>
+          <a:p>
+            <a:endParaRPr lang="ru-RU" baseline="0" dirty="0" smtClean="0"/>
+          </a:p>
+          <a:p>
+            <a:r>
+              <a:rPr lang="ru-RU" baseline="0" dirty="0" smtClean="0"/>
+              <a:t>В качестве примера </a:t>
             </a:r>
             <a:r>
               <a:rPr lang="en-US" baseline="0" dirty="0" smtClean="0"/>
-              <a:t>STRIDE.</a:t>
-            </a:r>
-          </a:p>
-          <a:p>
+              <a:t>tampering</a:t>
+            </a:r>
             <a:r>
               <a:rPr lang="ru-RU" baseline="0" dirty="0" smtClean="0"/>
-              <a:t>Вот они здесь перечислены. Давайте по каждой из них пройдемся</a:t>
-            </a:r>
-            <a:endParaRPr lang="en-US" baseline="0" dirty="0" smtClean="0"/>
-          </a:p>
-          <a:p>
-            <a:endParaRPr lang="en-US" baseline="0" dirty="0" smtClean="0"/>
-          </a:p>
-          <a:p>
-            <a:endParaRPr lang="en-US" baseline="0" dirty="0" smtClean="0"/>
+              <a:t> можно рассмотреть опять–же электронную почту.</a:t>
+            </a:r>
           </a:p>
           <a:p>
             <a:r>
               <a:rPr lang="ru-RU" baseline="0" dirty="0" smtClean="0"/>
-              <a:t>В таблице приведены все угрозы с точки зрения </a:t>
+              <a:t>Злоумышленник может перехватить ваше письмо, поменять его содержимое и вы об этом никак не узнаете.</a:t>
+            </a:r>
+          </a:p>
+          <a:p>
+            <a:endParaRPr lang="ru-RU" baseline="0" dirty="0" smtClean="0"/>
+          </a:p>
+          <a:p>
+            <a:r>
+              <a:rPr lang="ru-RU" baseline="0" dirty="0" smtClean="0"/>
+              <a:t>Что важно, </a:t>
             </a:r>
             <a:r>
               <a:rPr lang="en-US" baseline="0" dirty="0" smtClean="0"/>
-              <a:t>SDL</a:t>
+              <a:t>tampering</a:t>
             </a:r>
             <a:r>
               <a:rPr lang="ru-RU" baseline="0" dirty="0" smtClean="0"/>
-              <a:t>, а также необходимые свойства компоненты, позволяющие избежать конкретной угрозы</a:t>
-            </a:r>
+              <a:t>-у подвержены не только данные, но и исполняемые модули:</a:t>
+            </a:r>
+          </a:p>
+          <a:p>
+            <a:endParaRPr lang="ru-RU" baseline="0" dirty="0" smtClean="0"/>
+          </a:p>
+          <a:p>
             <a:r>
               <a:rPr lang="ru-RU" baseline="0" dirty="0" smtClean="0"/>
-              <a:t>.</a:t>
-            </a:r>
-            <a:endParaRPr lang="en-US" baseline="0" dirty="0" smtClean="0"/>
-          </a:p>
-          <a:p>
-            <a:endParaRPr lang="en-US" baseline="0" dirty="0" smtClean="0"/>
-          </a:p>
-          <a:p>
+              <a:t>Например, злоумышленник может подменить приложение, </a:t>
+            </a:r>
+            <a:r>
+              <a:rPr lang="en-US" baseline="0" dirty="0" smtClean="0"/>
+              <a:t>DLL</a:t>
+            </a:r>
             <a:r>
               <a:rPr lang="ru-RU" baseline="0" dirty="0" smtClean="0"/>
-              <a:t>Теперь мы обсудим каждую угрозу более детально</a:t>
-            </a:r>
-            <a:endParaRPr lang="ru-RU" baseline="0" dirty="0" smtClean="0"/>
-          </a:p>
-          <a:p>
-            <a:endParaRPr lang="ru-RU" baseline="0" dirty="0" smtClean="0"/>
-          </a:p>
-          <a:p>
-            <a:endParaRPr lang="ru-RU" baseline="0" dirty="0" smtClean="0"/>
+              <a:t>, скрипт на свой, и если у вашей системы нет проверки целостности, то вы об этом никак не узнаете и запустите зловредное приложение.</a:t>
+            </a:r>
           </a:p>
         </p:txBody>
       </p:sp>
@@ -5207,7 +4900,7 @@
     </p:spTree>
     <p:extLst>
       <p:ext uri="{BB962C8B-B14F-4D97-AF65-F5344CB8AC3E}">
-        <p14:creationId xmlns:p14="http://schemas.microsoft.com/office/powerpoint/2010/main" val="314644239"/>
+        <p14:creationId xmlns:p14="http://schemas.microsoft.com/office/powerpoint/2010/main" val="722600875"/>
       </p:ext>
     </p:extLst>
   </p:cSld>
@@ -5262,16 +4955,61 @@
           <a:lstStyle/>
           <a:p>
             <a:r>
+              <a:rPr lang="en-US" baseline="0" dirty="0" smtClean="0"/>
+              <a:t>Repudiation – </a:t>
+            </a:r>
+            <a:r>
               <a:rPr lang="ru-RU" baseline="0" dirty="0" smtClean="0"/>
-              <a:t>Итак, </a:t>
+              <a:t>это процесс заметания следов.</a:t>
+            </a:r>
+          </a:p>
+          <a:p>
+            <a:endParaRPr lang="ru-RU" baseline="0" dirty="0" smtClean="0"/>
+          </a:p>
+          <a:p>
+            <a:r>
+              <a:rPr lang="ru-RU" baseline="0" dirty="0" smtClean="0"/>
+              <a:t>Например, если данные пользователя были скомпрометированы – например, все знают логин/пароль для входа в какую-нибудь систему.</a:t>
+            </a:r>
+          </a:p>
+          <a:p>
+            <a:r>
+              <a:rPr lang="ru-RU" baseline="0" dirty="0" smtClean="0"/>
+              <a:t>В этом случае, если </a:t>
+            </a:r>
+            <a:r>
+              <a:rPr lang="ru-RU" baseline="0" dirty="0" err="1" smtClean="0"/>
+              <a:t>злоумышленик</a:t>
+            </a:r>
+            <a:r>
+              <a:rPr lang="ru-RU" baseline="0" dirty="0" smtClean="0"/>
+              <a:t> завладеет такими данными, то он сможет выполнить несанкционированные действия, и никто не сможет выяснить, кто же на самом деле осуществил эти действия.</a:t>
+            </a:r>
+          </a:p>
+          <a:p>
+            <a:endParaRPr lang="ru-RU" baseline="0" dirty="0" smtClean="0"/>
+          </a:p>
+          <a:p>
+            <a:endParaRPr lang="ru-RU" baseline="0" dirty="0" smtClean="0"/>
+          </a:p>
+          <a:p>
+            <a:r>
+              <a:rPr lang="ru-RU" baseline="0" dirty="0" smtClean="0"/>
+              <a:t>Кто может еще привести пример </a:t>
             </a:r>
             <a:r>
               <a:rPr lang="en-US" baseline="0" dirty="0" smtClean="0"/>
-              <a:t>spoofing</a:t>
+              <a:t>repudiation</a:t>
             </a:r>
             <a:r>
               <a:rPr lang="ru-RU" baseline="0" dirty="0" smtClean="0"/>
-              <a:t> – процесс подмены пользователя или программы.</a:t>
+              <a:t> – например, у нас есть система, которая фиксирует количество неуспешных попыток логина.</a:t>
+            </a:r>
+          </a:p>
+          <a:p>
+            <a:r>
+              <a:rPr lang="ru-RU" baseline="0" dirty="0" smtClean="0"/>
+              <a:t>Если данная информация (о неуспешных попытках логина) не защищена должным образом, то злоумышленник может удалить всю информацию о неуспешных попытках логина.</a:t>
             </a:r>
           </a:p>
           <a:p>
@@ -5280,61 +5018,8 @@
           <a:p>
             <a:r>
               <a:rPr lang="ru-RU" baseline="0" dirty="0" smtClean="0"/>
-              <a:t>Эта атака возникает в том случае, если нет механизма проверки подлинности (аутентификации).</a:t>
-            </a:r>
-          </a:p>
-          <a:p>
-            <a:endParaRPr lang="ru-RU" baseline="0" dirty="0" smtClean="0"/>
-          </a:p>
-          <a:p>
-            <a:r>
-              <a:rPr lang="ru-RU" baseline="0" dirty="0" smtClean="0"/>
-              <a:t>Например, </a:t>
-            </a:r>
-            <a:r>
-              <a:rPr lang="ru-RU" baseline="0" dirty="0" err="1" smtClean="0"/>
-              <a:t>спуфинг</a:t>
-            </a:r>
-            <a:r>
-              <a:rPr lang="ru-RU" baseline="0" dirty="0" smtClean="0"/>
-              <a:t> </a:t>
-            </a:r>
-            <a:r>
-              <a:rPr lang="en-US" baseline="0" dirty="0" smtClean="0"/>
-              <a:t>e-mail:</a:t>
-            </a:r>
-          </a:p>
-          <a:p>
-            <a:endParaRPr lang="en-US" baseline="0" dirty="0" smtClean="0"/>
-          </a:p>
-          <a:p>
-            <a:r>
-              <a:rPr lang="ru-RU" baseline="0" dirty="0" smtClean="0"/>
-              <a:t>В </a:t>
-            </a:r>
-            <a:r>
-              <a:rPr lang="en-US" baseline="0" dirty="0" smtClean="0"/>
-              <a:t>e-mail</a:t>
-            </a:r>
-            <a:r>
-              <a:rPr lang="ru-RU" baseline="0" dirty="0" smtClean="0"/>
-              <a:t> есть поле «отправитель», эту информацию можно легко подделать. Если пользователь ответит на такое письмо, то оно будет доставлено </a:t>
-            </a:r>
-            <a:r>
-              <a:rPr lang="ru-RU" baseline="0" dirty="0" smtClean="0"/>
-              <a:t>злоумышленнику </a:t>
-            </a:r>
-            <a:r>
-              <a:rPr lang="ru-RU" baseline="0" dirty="0" smtClean="0"/>
-              <a:t>вместо легитимного пользователя</a:t>
-            </a:r>
-            <a:r>
-              <a:rPr lang="ru-RU" baseline="0" dirty="0" smtClean="0"/>
-              <a:t>.</a:t>
-            </a:r>
-          </a:p>
-          <a:p>
-            <a:endParaRPr lang="ru-RU" baseline="0" dirty="0" smtClean="0"/>
+              <a:t>Заметьте, при этом злоумышленник может и не получить доступ к системе, однако информация о неуспешном логине исчезнет.</a:t>
+            </a:r>
           </a:p>
         </p:txBody>
       </p:sp>
@@ -5365,7 +5050,7 @@
     </p:spTree>
     <p:extLst>
       <p:ext uri="{BB962C8B-B14F-4D97-AF65-F5344CB8AC3E}">
-        <p14:creationId xmlns:p14="http://schemas.microsoft.com/office/powerpoint/2010/main" val="1574545940"/>
+        <p14:creationId xmlns:p14="http://schemas.microsoft.com/office/powerpoint/2010/main" val="30538106"/>
       </p:ext>
     </p:extLst>
   </p:cSld>
@@ -28069,11 +27754,11 @@
                   <a:srgbClr val="C00000"/>
                 </a:solidFill>
               </a:rPr>
-              <a:t>Tampering</a:t>
+              <a:t>Information disclosure</a:t>
             </a:r>
             <a:r>
               <a:rPr lang="en-US" dirty="0" smtClean="0"/>
-              <a:t> - integrity</a:t>
+              <a:t> - confidentiality</a:t>
             </a:r>
             <a:endParaRPr lang="ru-RU" dirty="0"/>
           </a:p>
@@ -28117,7 +27802,7 @@
             </a:pPr>
             <a:r>
               <a:rPr lang="ru-RU" sz="2800" dirty="0" smtClean="0"/>
-              <a:t>Несанкционированный процесс изменения (разрушения) данных или программы.</a:t>
+              <a:t>Несанкционированное раскрытие информации</a:t>
             </a:r>
             <a:endParaRPr lang="ru-RU" sz="2800" dirty="0"/>
           </a:p>
@@ -28126,7 +27811,7 @@
     </p:spTree>
     <p:extLst>
       <p:ext uri="{BB962C8B-B14F-4D97-AF65-F5344CB8AC3E}">
-        <p14:creationId xmlns:p14="http://schemas.microsoft.com/office/powerpoint/2010/main" val="3285988337"/>
+        <p14:creationId xmlns:p14="http://schemas.microsoft.com/office/powerpoint/2010/main" val="1407972076"/>
       </p:ext>
     </p:extLst>
   </p:cSld>
@@ -28181,11 +27866,11 @@
                   <a:srgbClr val="C00000"/>
                 </a:solidFill>
               </a:rPr>
-              <a:t>Repudiation</a:t>
+              <a:t>Denial of service</a:t>
             </a:r>
             <a:r>
               <a:rPr lang="en-US" dirty="0" smtClean="0"/>
-              <a:t> – non-repudiation</a:t>
+              <a:t> - availability</a:t>
             </a:r>
             <a:endParaRPr lang="ru-RU" dirty="0"/>
           </a:p>
@@ -28229,7 +27914,7 @@
             </a:pPr>
             <a:r>
               <a:rPr lang="ru-RU" sz="2800" dirty="0" smtClean="0"/>
-              <a:t>Заметание следов (запутывание).</a:t>
+              <a:t>Отказ в обслуживании</a:t>
             </a:r>
             <a:endParaRPr lang="ru-RU" sz="2800" dirty="0"/>
           </a:p>
@@ -28238,7 +27923,7 @@
     </p:spTree>
     <p:extLst>
       <p:ext uri="{BB962C8B-B14F-4D97-AF65-F5344CB8AC3E}">
-        <p14:creationId xmlns:p14="http://schemas.microsoft.com/office/powerpoint/2010/main" val="2530193212"/>
+        <p14:creationId xmlns:p14="http://schemas.microsoft.com/office/powerpoint/2010/main" val="2019271087"/>
       </p:ext>
     </p:extLst>
   </p:cSld>
@@ -28288,25 +27973,40 @@
           <a:lstStyle/>
           <a:p>
             <a:r>
-              <a:rPr lang="en-US" dirty="0" smtClean="0">
+              <a:rPr lang="en-US" sz="2800" dirty="0" smtClean="0">
                 <a:solidFill>
                   <a:srgbClr val="C00000"/>
                 </a:solidFill>
               </a:rPr>
-              <a:t>Information </a:t>
-            </a:r>
-            <a:r>
-              <a:rPr lang="en-US" dirty="0" smtClean="0">
+              <a:t>Elevation </a:t>
+            </a:r>
+            <a:r>
+              <a:rPr lang="en-US" sz="2800" dirty="0">
                 <a:solidFill>
                   <a:srgbClr val="C00000"/>
                 </a:solidFill>
               </a:rPr>
-              <a:t>disclosure</a:t>
-            </a:r>
-            <a:r>
-              <a:rPr lang="en-US" dirty="0" smtClean="0"/>
-              <a:t> - confidentiality</a:t>
-            </a:r>
+              <a:t>of </a:t>
+            </a:r>
+            <a:r>
+              <a:rPr lang="en-US" sz="2800" dirty="0" smtClean="0">
+                <a:solidFill>
+                  <a:srgbClr val="C00000"/>
+                </a:solidFill>
+              </a:rPr>
+              <a:t>Privilege</a:t>
+            </a:r>
+            <a:r>
+              <a:rPr lang="en-US" sz="2800" dirty="0" smtClean="0"/>
+              <a:t> - authorization</a:t>
+            </a:r>
+            <a:r>
+              <a:rPr lang="ru-RU" sz="2800" dirty="0"/>
+              <a:t/>
+            </a:r>
+            <a:br>
+              <a:rPr lang="ru-RU" sz="2800" dirty="0"/>
+            </a:br>
             <a:endParaRPr lang="ru-RU" dirty="0"/>
           </a:p>
         </p:txBody>
@@ -28349,7 +28049,7 @@
             </a:pPr>
             <a:r>
               <a:rPr lang="ru-RU" sz="2800" dirty="0" smtClean="0"/>
-              <a:t>Несанкционированное раскрытие информации</a:t>
+              <a:t>Несанкционированное получение привилегий</a:t>
             </a:r>
             <a:endParaRPr lang="ru-RU" sz="2800" dirty="0"/>
           </a:p>
@@ -28358,7 +28058,7 @@
     </p:spTree>
     <p:extLst>
       <p:ext uri="{BB962C8B-B14F-4D97-AF65-F5344CB8AC3E}">
-        <p14:creationId xmlns:p14="http://schemas.microsoft.com/office/powerpoint/2010/main" val="1407972076"/>
+        <p14:creationId xmlns:p14="http://schemas.microsoft.com/office/powerpoint/2010/main" val="345684248"/>
       </p:ext>
     </p:extLst>
   </p:cSld>
@@ -28408,24 +28108,8 @@
           <a:lstStyle/>
           <a:p>
             <a:r>
-              <a:rPr lang="en-US" dirty="0" smtClean="0">
-                <a:solidFill>
-                  <a:srgbClr val="C00000"/>
-                </a:solidFill>
-              </a:rPr>
-              <a:t>Denial of </a:t>
-            </a:r>
-            <a:r>
-              <a:rPr lang="en-US" dirty="0" smtClean="0">
-                <a:solidFill>
-                  <a:srgbClr val="C00000"/>
-                </a:solidFill>
-              </a:rPr>
-              <a:t>service</a:t>
-            </a:r>
-            <a:r>
               <a:rPr lang="en-US" dirty="0" smtClean="0"/>
-              <a:t> - availability</a:t>
+              <a:t>Threat modelling</a:t>
             </a:r>
             <a:endParaRPr lang="ru-RU" dirty="0"/>
           </a:p>
@@ -28433,7 +28117,7 @@
       </p:sp>
       <p:sp>
         <p:nvSpPr>
-          <p:cNvPr id="6" name="Content Placeholder 5"/>
+          <p:cNvPr id="3" name="Объект 2"/>
           <p:cNvSpPr>
             <a:spLocks noGrp="1"/>
           </p:cNvSpPr>
@@ -28441,44 +28125,53 @@
             <p:ph sz="quarter" idx="12"/>
           </p:nvPr>
         </p:nvSpPr>
-        <p:spPr/>
+        <p:spPr>
+          <a:xfrm>
+            <a:off x="357441" y="1167481"/>
+            <a:ext cx="8426450" cy="3492501"/>
+          </a:xfrm>
+        </p:spPr>
         <p:txBody>
           <a:bodyPr/>
           <a:lstStyle/>
           <a:p>
-            <a:pPr marL="0" indent="0" algn="ctr">
-              <a:buNone/>
-            </a:pPr>
+            <a:r>
+              <a:rPr lang="ru-RU" sz="2400" dirty="0" smtClean="0"/>
+              <a:t>Идентифицировать угрозы</a:t>
+            </a:r>
+          </a:p>
+          <a:p>
+            <a:endParaRPr lang="ru-RU" sz="2400" dirty="0"/>
+          </a:p>
+          <a:p>
+            <a:r>
+              <a:rPr lang="ru-RU" sz="2400" dirty="0"/>
+              <a:t>Составить список </a:t>
+            </a:r>
+            <a:r>
+              <a:rPr lang="ru-RU" sz="2400" dirty="0" smtClean="0"/>
+              <a:t>угроз</a:t>
+            </a:r>
+          </a:p>
+          <a:p>
+            <a:endParaRPr lang="ru-RU" sz="2400" dirty="0"/>
+          </a:p>
+          <a:p>
+            <a:r>
+              <a:rPr lang="ru-RU" sz="2400" dirty="0" smtClean="0"/>
+              <a:t>Упорядочить угрозы согласно приоритета</a:t>
+            </a:r>
+            <a:endParaRPr lang="ru-RU" sz="2400" dirty="0"/>
+          </a:p>
+          <a:p>
             <a:endParaRPr lang="ru-RU" sz="1800" dirty="0" smtClean="0"/>
-          </a:p>
-          <a:p>
-            <a:pPr marL="0" indent="0" algn="ctr">
-              <a:buNone/>
-            </a:pPr>
-            <a:endParaRPr lang="ru-RU" sz="1800" dirty="0" smtClean="0"/>
-          </a:p>
-          <a:p>
-            <a:pPr marL="0" indent="0" algn="ctr">
-              <a:buNone/>
-            </a:pPr>
-            <a:endParaRPr lang="ru-RU" sz="1800" dirty="0" smtClean="0"/>
-          </a:p>
-          <a:p>
-            <a:pPr marL="0" indent="0" algn="ctr">
-              <a:buNone/>
-            </a:pPr>
-            <a:r>
-              <a:rPr lang="ru-RU" sz="2800" dirty="0" smtClean="0"/>
-              <a:t>Отказ в обслуживании</a:t>
-            </a:r>
-            <a:endParaRPr lang="ru-RU" sz="2800" dirty="0"/>
           </a:p>
         </p:txBody>
       </p:sp>
     </p:spTree>
     <p:extLst>
       <p:ext uri="{BB962C8B-B14F-4D97-AF65-F5344CB8AC3E}">
-        <p14:creationId xmlns:p14="http://schemas.microsoft.com/office/powerpoint/2010/main" val="2019271087"/>
+        <p14:creationId xmlns:p14="http://schemas.microsoft.com/office/powerpoint/2010/main" val="3539263801"/>
       </p:ext>
     </p:extLst>
   </p:cSld>
@@ -28514,254 +28207,6 @@
       </p:grpSpPr>
       <p:sp>
         <p:nvSpPr>
-          <p:cNvPr id="2" name="Заголовок 1"/>
-          <p:cNvSpPr>
-            <a:spLocks noGrp="1"/>
-          </p:cNvSpPr>
-          <p:nvPr>
-            <p:ph type="title"/>
-          </p:nvPr>
-        </p:nvSpPr>
-        <p:spPr/>
-        <p:txBody>
-          <a:bodyPr/>
-          <a:lstStyle/>
-          <a:p>
-            <a:r>
-              <a:rPr lang="en-US" sz="2800" dirty="0" smtClean="0">
-                <a:solidFill>
-                  <a:srgbClr val="C00000"/>
-                </a:solidFill>
-              </a:rPr>
-              <a:t>Elevation </a:t>
-            </a:r>
-            <a:r>
-              <a:rPr lang="en-US" sz="2800" dirty="0">
-                <a:solidFill>
-                  <a:srgbClr val="C00000"/>
-                </a:solidFill>
-              </a:rPr>
-              <a:t>of </a:t>
-            </a:r>
-            <a:r>
-              <a:rPr lang="en-US" sz="2800" dirty="0" smtClean="0">
-                <a:solidFill>
-                  <a:srgbClr val="C00000"/>
-                </a:solidFill>
-              </a:rPr>
-              <a:t>Privilege</a:t>
-            </a:r>
-            <a:r>
-              <a:rPr lang="en-US" sz="2800" dirty="0" smtClean="0"/>
-              <a:t> - authorization</a:t>
-            </a:r>
-            <a:r>
-              <a:rPr lang="ru-RU" sz="2800" dirty="0"/>
-              <a:t/>
-            </a:r>
-            <a:br>
-              <a:rPr lang="ru-RU" sz="2800" dirty="0"/>
-            </a:br>
-            <a:endParaRPr lang="ru-RU" dirty="0"/>
-          </a:p>
-        </p:txBody>
-      </p:sp>
-      <p:sp>
-        <p:nvSpPr>
-          <p:cNvPr id="6" name="Content Placeholder 5"/>
-          <p:cNvSpPr>
-            <a:spLocks noGrp="1"/>
-          </p:cNvSpPr>
-          <p:nvPr>
-            <p:ph sz="quarter" idx="12"/>
-          </p:nvPr>
-        </p:nvSpPr>
-        <p:spPr/>
-        <p:txBody>
-          <a:bodyPr/>
-          <a:lstStyle/>
-          <a:p>
-            <a:pPr marL="0" indent="0" algn="ctr">
-              <a:buNone/>
-            </a:pPr>
-            <a:endParaRPr lang="ru-RU" sz="1800" dirty="0" smtClean="0"/>
-          </a:p>
-          <a:p>
-            <a:pPr marL="0" indent="0" algn="ctr">
-              <a:buNone/>
-            </a:pPr>
-            <a:endParaRPr lang="ru-RU" sz="1800" dirty="0" smtClean="0"/>
-          </a:p>
-          <a:p>
-            <a:pPr marL="0" indent="0" algn="ctr">
-              <a:buNone/>
-            </a:pPr>
-            <a:endParaRPr lang="ru-RU" sz="1800" dirty="0" smtClean="0"/>
-          </a:p>
-          <a:p>
-            <a:pPr marL="0" indent="0" algn="ctr">
-              <a:buNone/>
-            </a:pPr>
-            <a:r>
-              <a:rPr lang="ru-RU" sz="2800" dirty="0" smtClean="0"/>
-              <a:t>Несанкционированное получение привилегий</a:t>
-            </a:r>
-            <a:endParaRPr lang="ru-RU" sz="2800" dirty="0"/>
-          </a:p>
-        </p:txBody>
-      </p:sp>
-    </p:spTree>
-    <p:extLst>
-      <p:ext uri="{BB962C8B-B14F-4D97-AF65-F5344CB8AC3E}">
-        <p14:creationId xmlns:p14="http://schemas.microsoft.com/office/powerpoint/2010/main" val="345684248"/>
-      </p:ext>
-    </p:extLst>
-  </p:cSld>
-  <p:clrMapOvr>
-    <a:masterClrMapping/>
-  </p:clrMapOvr>
-  <p:timing>
-    <p:tnLst>
-      <p:par>
-        <p:cTn id="1" dur="indefinite" restart="never" nodeType="tmRoot"/>
-      </p:par>
-    </p:tnLst>
-  </p:timing>
-</p:sld>
-</file>
-
-<file path=ppt/slides/slide15.xml><?xml version="1.0" encoding="utf-8"?>
-<p:sld xmlns:a="http://schemas.openxmlformats.org/drawingml/2006/main" xmlns:r="http://schemas.openxmlformats.org/officeDocument/2006/relationships" xmlns:p="http://schemas.openxmlformats.org/presentationml/2006/main">
-  <p:cSld>
-    <p:spTree>
-      <p:nvGrpSpPr>
-        <p:cNvPr id="1" name=""/>
-        <p:cNvGrpSpPr/>
-        <p:nvPr/>
-      </p:nvGrpSpPr>
-      <p:grpSpPr>
-        <a:xfrm>
-          <a:off x="0" y="0"/>
-          <a:ext cx="0" cy="0"/>
-          <a:chOff x="0" y="0"/>
-          <a:chExt cx="0" cy="0"/>
-        </a:xfrm>
-      </p:grpSpPr>
-      <p:sp>
-        <p:nvSpPr>
-          <p:cNvPr id="2" name="Заголовок 1"/>
-          <p:cNvSpPr>
-            <a:spLocks noGrp="1"/>
-          </p:cNvSpPr>
-          <p:nvPr>
-            <p:ph type="title"/>
-          </p:nvPr>
-        </p:nvSpPr>
-        <p:spPr/>
-        <p:txBody>
-          <a:bodyPr/>
-          <a:lstStyle/>
-          <a:p>
-            <a:r>
-              <a:rPr lang="en-US" dirty="0" smtClean="0"/>
-              <a:t>Threat modelling</a:t>
-            </a:r>
-            <a:endParaRPr lang="ru-RU" dirty="0"/>
-          </a:p>
-        </p:txBody>
-      </p:sp>
-      <p:sp>
-        <p:nvSpPr>
-          <p:cNvPr id="3" name="Объект 2"/>
-          <p:cNvSpPr>
-            <a:spLocks noGrp="1"/>
-          </p:cNvSpPr>
-          <p:nvPr>
-            <p:ph sz="quarter" idx="12"/>
-          </p:nvPr>
-        </p:nvSpPr>
-        <p:spPr>
-          <a:xfrm>
-            <a:off x="357441" y="1167481"/>
-            <a:ext cx="8426450" cy="3492501"/>
-          </a:xfrm>
-        </p:spPr>
-        <p:txBody>
-          <a:bodyPr/>
-          <a:lstStyle/>
-          <a:p>
-            <a:r>
-              <a:rPr lang="ru-RU" sz="2400" dirty="0" smtClean="0"/>
-              <a:t>Идентифицировать угрозы</a:t>
-            </a:r>
-          </a:p>
-          <a:p>
-            <a:endParaRPr lang="ru-RU" sz="2400" dirty="0"/>
-          </a:p>
-          <a:p>
-            <a:r>
-              <a:rPr lang="ru-RU" sz="2400" dirty="0"/>
-              <a:t>Составить список </a:t>
-            </a:r>
-            <a:r>
-              <a:rPr lang="ru-RU" sz="2400" dirty="0" smtClean="0"/>
-              <a:t>угроз</a:t>
-            </a:r>
-          </a:p>
-          <a:p>
-            <a:endParaRPr lang="ru-RU" sz="2400" dirty="0"/>
-          </a:p>
-          <a:p>
-            <a:r>
-              <a:rPr lang="ru-RU" sz="2400" dirty="0" smtClean="0"/>
-              <a:t>Упорядочить угрозы согласно приоритета</a:t>
-            </a:r>
-            <a:endParaRPr lang="ru-RU" sz="2400" dirty="0"/>
-          </a:p>
-          <a:p>
-            <a:endParaRPr lang="ru-RU" sz="1800" dirty="0" smtClean="0"/>
-          </a:p>
-        </p:txBody>
-      </p:sp>
-    </p:spTree>
-    <p:extLst>
-      <p:ext uri="{BB962C8B-B14F-4D97-AF65-F5344CB8AC3E}">
-        <p14:creationId xmlns:p14="http://schemas.microsoft.com/office/powerpoint/2010/main" val="3539263801"/>
-      </p:ext>
-    </p:extLst>
-  </p:cSld>
-  <p:clrMapOvr>
-    <a:masterClrMapping/>
-  </p:clrMapOvr>
-  <p:timing>
-    <p:tnLst>
-      <p:par>
-        <p:cTn id="1" dur="indefinite" restart="never" nodeType="tmRoot"/>
-      </p:par>
-    </p:tnLst>
-  </p:timing>
-</p:sld>
-</file>
-
-<file path=ppt/slides/slide16.xml><?xml version="1.0" encoding="utf-8"?>
-<p:sld xmlns:a="http://schemas.openxmlformats.org/drawingml/2006/main" xmlns:r="http://schemas.openxmlformats.org/officeDocument/2006/relationships" xmlns:p="http://schemas.openxmlformats.org/presentationml/2006/main">
-  <p:cSld>
-    <p:spTree>
-      <p:nvGrpSpPr>
-        <p:cNvPr id="1" name=""/>
-        <p:cNvGrpSpPr/>
-        <p:nvPr/>
-      </p:nvGrpSpPr>
-      <p:grpSpPr>
-        <a:xfrm>
-          <a:off x="0" y="0"/>
-          <a:ext cx="0" cy="0"/>
-          <a:chOff x="0" y="0"/>
-          <a:chExt cx="0" cy="0"/>
-        </a:xfrm>
-      </p:grpSpPr>
-      <p:sp>
-        <p:nvSpPr>
           <p:cNvPr id="2" name="Текст 1"/>
           <p:cNvSpPr>
             <a:spLocks noGrp="1"/>
@@ -28823,7 +28268,7 @@
 </p:sld>
 </file>
 
-<file path=ppt/slides/slide17.xml><?xml version="1.0" encoding="utf-8"?>
+<file path=ppt/slides/slide15.xml><?xml version="1.0" encoding="utf-8"?>
 <p:sld xmlns:a="http://schemas.openxmlformats.org/drawingml/2006/main" xmlns:r="http://schemas.openxmlformats.org/officeDocument/2006/relationships" xmlns:p="http://schemas.openxmlformats.org/presentationml/2006/main">
   <p:cSld>
     <p:spTree>
@@ -29444,7 +28889,7 @@
 </p:sld>
 </file>
 
-<file path=ppt/slides/slide18.xml><?xml version="1.0" encoding="utf-8"?>
+<file path=ppt/slides/slide16.xml><?xml version="1.0" encoding="utf-8"?>
 <p:sld xmlns:a="http://schemas.openxmlformats.org/drawingml/2006/main" xmlns:r="http://schemas.openxmlformats.org/officeDocument/2006/relationships" xmlns:p="http://schemas.openxmlformats.org/presentationml/2006/main">
   <p:cSld>
     <p:spTree>
@@ -29529,7 +28974,7 @@
 </p:sld>
 </file>
 
-<file path=ppt/slides/slide19.xml><?xml version="1.0" encoding="utf-8"?>
+<file path=ppt/slides/slide17.xml><?xml version="1.0" encoding="utf-8"?>
 <p:sld xmlns:a="http://schemas.openxmlformats.org/drawingml/2006/main" xmlns:r="http://schemas.openxmlformats.org/officeDocument/2006/relationships" xmlns:p="http://schemas.openxmlformats.org/presentationml/2006/main">
   <p:cSld>
     <p:spTree>
@@ -30145,115 +29590,7 @@
 </p:sld>
 </file>
 
-<file path=ppt/slides/slide2.xml><?xml version="1.0" encoding="utf-8"?>
-<p:sld xmlns:a="http://schemas.openxmlformats.org/drawingml/2006/main" xmlns:r="http://schemas.openxmlformats.org/officeDocument/2006/relationships" xmlns:p="http://schemas.openxmlformats.org/presentationml/2006/main">
-  <p:cSld>
-    <p:spTree>
-      <p:nvGrpSpPr>
-        <p:cNvPr id="1" name=""/>
-        <p:cNvGrpSpPr/>
-        <p:nvPr/>
-      </p:nvGrpSpPr>
-      <p:grpSpPr>
-        <a:xfrm>
-          <a:off x="0" y="0"/>
-          <a:ext cx="0" cy="0"/>
-          <a:chOff x="0" y="0"/>
-          <a:chExt cx="0" cy="0"/>
-        </a:xfrm>
-      </p:grpSpPr>
-      <p:sp>
-        <p:nvSpPr>
-          <p:cNvPr id="2" name="Заголовок 1"/>
-          <p:cNvSpPr>
-            <a:spLocks noGrp="1"/>
-          </p:cNvSpPr>
-          <p:nvPr>
-            <p:ph type="title"/>
-          </p:nvPr>
-        </p:nvSpPr>
-        <p:spPr/>
-        <p:txBody>
-          <a:bodyPr/>
-          <a:lstStyle/>
-          <a:p>
-            <a:r>
-              <a:rPr lang="en-US" dirty="0"/>
-              <a:t>agenda</a:t>
-            </a:r>
-            <a:endParaRPr lang="ru-RU" dirty="0"/>
-          </a:p>
-        </p:txBody>
-      </p:sp>
-      <p:sp>
-        <p:nvSpPr>
-          <p:cNvPr id="3" name="Объект 2"/>
-          <p:cNvSpPr>
-            <a:spLocks noGrp="1"/>
-          </p:cNvSpPr>
-          <p:nvPr>
-            <p:ph sz="quarter" idx="12"/>
-          </p:nvPr>
-        </p:nvSpPr>
-        <p:spPr/>
-        <p:txBody>
-          <a:bodyPr/>
-          <a:lstStyle/>
-          <a:p>
-            <a:endParaRPr lang="ru-RU" sz="2400" dirty="0" smtClean="0"/>
-          </a:p>
-          <a:p>
-            <a:r>
-              <a:rPr lang="ru-RU" sz="2400" dirty="0" smtClean="0"/>
-              <a:t>Теоретическая часть</a:t>
-            </a:r>
-            <a:endParaRPr lang="ru-RU" sz="2400" dirty="0"/>
-          </a:p>
-          <a:p>
-            <a:endParaRPr lang="ru-RU" sz="2400" dirty="0" smtClean="0"/>
-          </a:p>
-          <a:p>
-            <a:endParaRPr lang="ru-RU" sz="2400" dirty="0"/>
-          </a:p>
-          <a:p>
-            <a:r>
-              <a:rPr lang="ru-RU" sz="2400" dirty="0" smtClean="0"/>
-              <a:t>Практическая часть</a:t>
-            </a:r>
-            <a:endParaRPr lang="ru-RU" sz="2400" dirty="0"/>
-          </a:p>
-          <a:p>
-            <a:endParaRPr lang="ru-RU" sz="2400" dirty="0"/>
-          </a:p>
-          <a:p>
-            <a:endParaRPr lang="en-US" sz="2400" dirty="0"/>
-          </a:p>
-          <a:p>
-            <a:endParaRPr lang="ru-RU" sz="3200" dirty="0"/>
-          </a:p>
-        </p:txBody>
-      </p:sp>
-    </p:spTree>
-    <p:extLst>
-      <p:ext uri="{BB962C8B-B14F-4D97-AF65-F5344CB8AC3E}">
-        <p14:creationId xmlns:p14="http://schemas.microsoft.com/office/powerpoint/2010/main" val="2637384618"/>
-      </p:ext>
-    </p:extLst>
-  </p:cSld>
-  <p:clrMapOvr>
-    <a:masterClrMapping/>
-  </p:clrMapOvr>
-  <p:timing>
-    <p:tnLst>
-      <p:par>
-        <p:cTn id="1" dur="indefinite" restart="never" nodeType="tmRoot"/>
-      </p:par>
-    </p:tnLst>
-  </p:timing>
-</p:sld>
-</file>
-
-<file path=ppt/slides/slide20.xml><?xml version="1.0" encoding="utf-8"?>
+<file path=ppt/slides/slide18.xml><?xml version="1.0" encoding="utf-8"?>
 <p:sld xmlns:a="http://schemas.openxmlformats.org/drawingml/2006/main" xmlns:r="http://schemas.openxmlformats.org/officeDocument/2006/relationships" xmlns:p="http://schemas.openxmlformats.org/presentationml/2006/main">
   <p:cSld>
     <p:spTree>
@@ -30333,7 +29670,7 @@
 </p:sld>
 </file>
 
-<file path=ppt/slides/slide21.xml><?xml version="1.0" encoding="utf-8"?>
+<file path=ppt/slides/slide19.xml><?xml version="1.0" encoding="utf-8"?>
 <p:sld xmlns:a="http://schemas.openxmlformats.org/drawingml/2006/main" xmlns:r="http://schemas.openxmlformats.org/officeDocument/2006/relationships" xmlns:p="http://schemas.openxmlformats.org/presentationml/2006/main">
   <p:cSld>
     <p:spTree>
@@ -30665,7 +30002,115 @@
 </p:sld>
 </file>
 
-<file path=ppt/slides/slide22.xml><?xml version="1.0" encoding="utf-8"?>
+<file path=ppt/slides/slide2.xml><?xml version="1.0" encoding="utf-8"?>
+<p:sld xmlns:a="http://schemas.openxmlformats.org/drawingml/2006/main" xmlns:r="http://schemas.openxmlformats.org/officeDocument/2006/relationships" xmlns:p="http://schemas.openxmlformats.org/presentationml/2006/main">
+  <p:cSld>
+    <p:spTree>
+      <p:nvGrpSpPr>
+        <p:cNvPr id="1" name=""/>
+        <p:cNvGrpSpPr/>
+        <p:nvPr/>
+      </p:nvGrpSpPr>
+      <p:grpSpPr>
+        <a:xfrm>
+          <a:off x="0" y="0"/>
+          <a:ext cx="0" cy="0"/>
+          <a:chOff x="0" y="0"/>
+          <a:chExt cx="0" cy="0"/>
+        </a:xfrm>
+      </p:grpSpPr>
+      <p:sp>
+        <p:nvSpPr>
+          <p:cNvPr id="2" name="Заголовок 1"/>
+          <p:cNvSpPr>
+            <a:spLocks noGrp="1"/>
+          </p:cNvSpPr>
+          <p:nvPr>
+            <p:ph type="title"/>
+          </p:nvPr>
+        </p:nvSpPr>
+        <p:spPr/>
+        <p:txBody>
+          <a:bodyPr/>
+          <a:lstStyle/>
+          <a:p>
+            <a:r>
+              <a:rPr lang="en-US" dirty="0"/>
+              <a:t>agenda</a:t>
+            </a:r>
+            <a:endParaRPr lang="ru-RU" dirty="0"/>
+          </a:p>
+        </p:txBody>
+      </p:sp>
+      <p:sp>
+        <p:nvSpPr>
+          <p:cNvPr id="3" name="Объект 2"/>
+          <p:cNvSpPr>
+            <a:spLocks noGrp="1"/>
+          </p:cNvSpPr>
+          <p:nvPr>
+            <p:ph sz="quarter" idx="12"/>
+          </p:nvPr>
+        </p:nvSpPr>
+        <p:spPr/>
+        <p:txBody>
+          <a:bodyPr/>
+          <a:lstStyle/>
+          <a:p>
+            <a:endParaRPr lang="ru-RU" sz="2400" dirty="0" smtClean="0"/>
+          </a:p>
+          <a:p>
+            <a:r>
+              <a:rPr lang="ru-RU" sz="2400" dirty="0" smtClean="0"/>
+              <a:t>Теоретическая часть</a:t>
+            </a:r>
+            <a:endParaRPr lang="ru-RU" sz="2400" dirty="0"/>
+          </a:p>
+          <a:p>
+            <a:endParaRPr lang="ru-RU" sz="2400" dirty="0" smtClean="0"/>
+          </a:p>
+          <a:p>
+            <a:endParaRPr lang="ru-RU" sz="2400" dirty="0"/>
+          </a:p>
+          <a:p>
+            <a:r>
+              <a:rPr lang="ru-RU" sz="2400" dirty="0" smtClean="0"/>
+              <a:t>Практическая часть</a:t>
+            </a:r>
+            <a:endParaRPr lang="ru-RU" sz="2400" dirty="0"/>
+          </a:p>
+          <a:p>
+            <a:endParaRPr lang="ru-RU" sz="2400" dirty="0"/>
+          </a:p>
+          <a:p>
+            <a:endParaRPr lang="en-US" sz="2400" dirty="0"/>
+          </a:p>
+          <a:p>
+            <a:endParaRPr lang="ru-RU" sz="3200" dirty="0"/>
+          </a:p>
+        </p:txBody>
+      </p:sp>
+    </p:spTree>
+    <p:extLst>
+      <p:ext uri="{BB962C8B-B14F-4D97-AF65-F5344CB8AC3E}">
+        <p14:creationId xmlns:p14="http://schemas.microsoft.com/office/powerpoint/2010/main" val="2637384618"/>
+      </p:ext>
+    </p:extLst>
+  </p:cSld>
+  <p:clrMapOvr>
+    <a:masterClrMapping/>
+  </p:clrMapOvr>
+  <p:timing>
+    <p:tnLst>
+      <p:par>
+        <p:cTn id="1" dur="indefinite" restart="never" nodeType="tmRoot"/>
+      </p:par>
+    </p:tnLst>
+  </p:timing>
+</p:sld>
+</file>
+
+<file path=ppt/slides/slide20.xml><?xml version="1.0" encoding="utf-8"?>
 <p:sld xmlns:a="http://schemas.openxmlformats.org/drawingml/2006/main" xmlns:r="http://schemas.openxmlformats.org/officeDocument/2006/relationships" xmlns:p="http://schemas.openxmlformats.org/presentationml/2006/main">
   <p:cSld>
     <p:spTree>
@@ -30840,7 +30285,7 @@
 </p:sld>
 </file>
 
-<file path=ppt/slides/slide23.xml><?xml version="1.0" encoding="utf-8"?>
+<file path=ppt/slides/slide21.xml><?xml version="1.0" encoding="utf-8"?>
 <p:sld xmlns:a="http://schemas.openxmlformats.org/drawingml/2006/main" xmlns:r="http://schemas.openxmlformats.org/officeDocument/2006/relationships" xmlns:p="http://schemas.openxmlformats.org/presentationml/2006/main">
   <p:cSld>
     <p:spTree>
@@ -30976,7 +30421,7 @@
 </p:sld>
 </file>
 
-<file path=ppt/slides/slide24.xml><?xml version="1.0" encoding="utf-8"?>
+<file path=ppt/slides/slide22.xml><?xml version="1.0" encoding="utf-8"?>
 <p:sld xmlns:a="http://schemas.openxmlformats.org/drawingml/2006/main" xmlns:r="http://schemas.openxmlformats.org/officeDocument/2006/relationships" xmlns:p="http://schemas.openxmlformats.org/presentationml/2006/main">
   <p:cSld>
     <p:spTree>
@@ -31340,7 +30785,7 @@
 </p:sld>
 </file>
 
-<file path=ppt/slides/slide25.xml><?xml version="1.0" encoding="utf-8"?>
+<file path=ppt/slides/slide23.xml><?xml version="1.0" encoding="utf-8"?>
 <p:sld xmlns:a="http://schemas.openxmlformats.org/drawingml/2006/main" xmlns:r="http://schemas.openxmlformats.org/officeDocument/2006/relationships" xmlns:p="http://schemas.openxmlformats.org/presentationml/2006/main">
   <p:cSld>
     <p:spTree>
@@ -31956,7 +31401,7 @@
 </p:sld>
 </file>
 
-<file path=ppt/slides/slide26.xml><?xml version="1.0" encoding="utf-8"?>
+<file path=ppt/slides/slide24.xml><?xml version="1.0" encoding="utf-8"?>
 <p:sld xmlns:a="http://schemas.openxmlformats.org/drawingml/2006/main" xmlns:r="http://schemas.openxmlformats.org/officeDocument/2006/relationships" xmlns:p="http://schemas.openxmlformats.org/presentationml/2006/main">
   <p:cSld>
     <p:spTree>
@@ -32567,7 +32012,7 @@
 </p:sld>
 </file>
 
-<file path=ppt/slides/slide27.xml><?xml version="1.0" encoding="utf-8"?>
+<file path=ppt/slides/slide25.xml><?xml version="1.0" encoding="utf-8"?>
 <p:sld xmlns:a="http://schemas.openxmlformats.org/drawingml/2006/main" xmlns:r="http://schemas.openxmlformats.org/officeDocument/2006/relationships" xmlns:p="http://schemas.openxmlformats.org/presentationml/2006/main">
   <p:cSld>
     <p:spTree>
@@ -33146,7 +32591,11 @@
           <a:bodyPr/>
           <a:lstStyle/>
           <a:p>
-            <a:endParaRPr lang="ru-RU"/>
+            <a:r>
+              <a:rPr lang="en-US" sz="2400" dirty="0" smtClean="0"/>
+              <a:t>Threat modelling</a:t>
+            </a:r>
+            <a:endParaRPr lang="ru-RU" sz="2400" dirty="0"/>
           </a:p>
         </p:txBody>
       </p:sp>
@@ -33227,193 +32676,20 @@
           <a:lstStyle/>
           <a:p>
             <a:r>
-              <a:rPr lang="ru-RU" dirty="0" smtClean="0"/>
-              <a:t>Что такое </a:t>
-            </a:r>
-            <a:r>
               <a:rPr lang="en-US" dirty="0" smtClean="0"/>
-              <a:t>SDL</a:t>
-            </a:r>
-            <a:endParaRPr lang="ru-RU" dirty="0"/>
-          </a:p>
-        </p:txBody>
-      </p:sp>
-      <p:sp>
-        <p:nvSpPr>
-          <p:cNvPr id="3" name="Content Placeholder 2"/>
-          <p:cNvSpPr>
-            <a:spLocks noGrp="1"/>
-          </p:cNvSpPr>
-          <p:nvPr>
-            <p:ph sz="quarter" idx="12"/>
-          </p:nvPr>
-        </p:nvSpPr>
-        <p:spPr/>
-        <p:txBody>
-          <a:bodyPr/>
-          <a:lstStyle/>
-          <a:p>
-            <a:r>
-              <a:rPr lang="en-US" sz="3200" dirty="0" smtClean="0"/>
-              <a:t>Threat modelling</a:t>
-            </a:r>
-          </a:p>
-          <a:p>
-            <a:endParaRPr lang="en-US" sz="3200" dirty="0" smtClean="0"/>
-          </a:p>
-          <a:p>
-            <a:r>
-              <a:rPr lang="en-US" sz="3200" dirty="0" smtClean="0"/>
-              <a:t>Data flow diagrams</a:t>
-            </a:r>
-          </a:p>
-          <a:p>
-            <a:endParaRPr lang="en-US" sz="3200" dirty="0" smtClean="0"/>
-          </a:p>
-          <a:p>
-            <a:r>
-              <a:rPr lang="en-US" sz="3200" dirty="0" smtClean="0"/>
-              <a:t>Threat mitigations</a:t>
-            </a:r>
-            <a:endParaRPr lang="ru-RU" sz="3200" dirty="0"/>
-          </a:p>
-        </p:txBody>
-      </p:sp>
-    </p:spTree>
-    <p:extLst>
-      <p:ext uri="{BB962C8B-B14F-4D97-AF65-F5344CB8AC3E}">
-        <p14:creationId xmlns:p14="http://schemas.microsoft.com/office/powerpoint/2010/main" val="4097155139"/>
-      </p:ext>
-    </p:extLst>
-  </p:cSld>
-  <p:clrMapOvr>
-    <a:masterClrMapping/>
-  </p:clrMapOvr>
-  <p:timing>
-    <p:tnLst>
-      <p:par>
-        <p:cTn id="1" dur="indefinite" restart="never" nodeType="tmRoot"/>
-      </p:par>
-    </p:tnLst>
-  </p:timing>
-</p:sld>
-</file>
-
-<file path=ppt/slides/slide7.xml><?xml version="1.0" encoding="utf-8"?>
-<p:sld xmlns:a="http://schemas.openxmlformats.org/drawingml/2006/main" xmlns:r="http://schemas.openxmlformats.org/officeDocument/2006/relationships" xmlns:p="http://schemas.openxmlformats.org/presentationml/2006/main">
-  <p:cSld>
-    <p:spTree>
-      <p:nvGrpSpPr>
-        <p:cNvPr id="1" name=""/>
-        <p:cNvGrpSpPr/>
-        <p:nvPr/>
-      </p:nvGrpSpPr>
-      <p:grpSpPr>
-        <a:xfrm>
-          <a:off x="0" y="0"/>
-          <a:ext cx="0" cy="0"/>
-          <a:chOff x="0" y="0"/>
-          <a:chExt cx="0" cy="0"/>
-        </a:xfrm>
-      </p:grpSpPr>
-      <p:sp>
-        <p:nvSpPr>
-          <p:cNvPr id="2" name="Текст 1"/>
-          <p:cNvSpPr>
-            <a:spLocks noGrp="1"/>
-          </p:cNvSpPr>
-          <p:nvPr>
-            <p:ph type="body" sz="quarter" idx="12"/>
-          </p:nvPr>
-        </p:nvSpPr>
-        <p:spPr/>
-        <p:txBody>
-          <a:bodyPr/>
-          <a:lstStyle/>
-          <a:p>
-            <a:endParaRPr lang="ru-RU"/>
-          </a:p>
-        </p:txBody>
-      </p:sp>
-      <p:sp>
-        <p:nvSpPr>
-          <p:cNvPr id="3" name="Текст 2"/>
-          <p:cNvSpPr>
-            <a:spLocks noGrp="1"/>
-          </p:cNvSpPr>
-          <p:nvPr>
-            <p:ph type="body" sz="quarter" idx="14"/>
-          </p:nvPr>
-        </p:nvSpPr>
-        <p:spPr/>
-        <p:txBody>
-          <a:bodyPr/>
-          <a:lstStyle/>
-          <a:p>
-            <a:pPr algn="ctr"/>
+              <a:t>Threat types (</a:t>
+            </a:r>
+            <a:r>
+              <a:rPr lang="en-US" dirty="0" smtClean="0">
+                <a:solidFill>
+                  <a:srgbClr val="C00000"/>
+                </a:solidFill>
+              </a:rPr>
+              <a:t>STRIDE</a:t>
+            </a:r>
             <a:r>
               <a:rPr lang="en-US" dirty="0" smtClean="0"/>
-              <a:t>Threat modelling</a:t>
-            </a:r>
-            <a:endParaRPr lang="ru-RU" dirty="0"/>
-          </a:p>
-        </p:txBody>
-      </p:sp>
-    </p:spTree>
-    <p:extLst>
-      <p:ext uri="{BB962C8B-B14F-4D97-AF65-F5344CB8AC3E}">
-        <p14:creationId xmlns:p14="http://schemas.microsoft.com/office/powerpoint/2010/main" val="2545113818"/>
-      </p:ext>
-    </p:extLst>
-  </p:cSld>
-  <p:clrMapOvr>
-    <a:masterClrMapping/>
-  </p:clrMapOvr>
-  <p:timing>
-    <p:tnLst>
-      <p:par>
-        <p:cTn id="1" dur="indefinite" restart="never" nodeType="tmRoot"/>
-      </p:par>
-    </p:tnLst>
-  </p:timing>
-</p:sld>
-</file>
-
-<file path=ppt/slides/slide8.xml><?xml version="1.0" encoding="utf-8"?>
-<p:sld xmlns:a="http://schemas.openxmlformats.org/drawingml/2006/main" xmlns:r="http://schemas.openxmlformats.org/officeDocument/2006/relationships" xmlns:p="http://schemas.openxmlformats.org/presentationml/2006/main">
-  <p:cSld>
-    <p:spTree>
-      <p:nvGrpSpPr>
-        <p:cNvPr id="1" name=""/>
-        <p:cNvGrpSpPr/>
-        <p:nvPr/>
-      </p:nvGrpSpPr>
-      <p:grpSpPr>
-        <a:xfrm>
-          <a:off x="0" y="0"/>
-          <a:ext cx="0" cy="0"/>
-          <a:chOff x="0" y="0"/>
-          <a:chExt cx="0" cy="0"/>
-        </a:xfrm>
-      </p:grpSpPr>
-      <p:sp>
-        <p:nvSpPr>
-          <p:cNvPr id="2" name="Заголовок 1"/>
-          <p:cNvSpPr>
-            <a:spLocks noGrp="1"/>
-          </p:cNvSpPr>
-          <p:nvPr>
-            <p:ph type="title"/>
-          </p:nvPr>
-        </p:nvSpPr>
-        <p:spPr/>
-        <p:txBody>
-          <a:bodyPr/>
-          <a:lstStyle/>
-          <a:p>
-            <a:r>
-              <a:rPr lang="en-US" dirty="0" smtClean="0"/>
-              <a:t>STRIDE</a:t>
+              <a:t>)</a:t>
             </a:r>
             <a:endParaRPr lang="ru-RU" dirty="0"/>
           </a:p>
@@ -33747,6 +33023,234 @@
 </p:sld>
 </file>
 
+<file path=ppt/slides/slide7.xml><?xml version="1.0" encoding="utf-8"?>
+<p:sld xmlns:a="http://schemas.openxmlformats.org/drawingml/2006/main" xmlns:r="http://schemas.openxmlformats.org/officeDocument/2006/relationships" xmlns:p="http://schemas.openxmlformats.org/presentationml/2006/main">
+  <p:cSld>
+    <p:spTree>
+      <p:nvGrpSpPr>
+        <p:cNvPr id="1" name=""/>
+        <p:cNvGrpSpPr/>
+        <p:nvPr/>
+      </p:nvGrpSpPr>
+      <p:grpSpPr>
+        <a:xfrm>
+          <a:off x="0" y="0"/>
+          <a:ext cx="0" cy="0"/>
+          <a:chOff x="0" y="0"/>
+          <a:chExt cx="0" cy="0"/>
+        </a:xfrm>
+      </p:grpSpPr>
+      <p:sp>
+        <p:nvSpPr>
+          <p:cNvPr id="2" name="Заголовок 1"/>
+          <p:cNvSpPr>
+            <a:spLocks noGrp="1"/>
+          </p:cNvSpPr>
+          <p:nvPr>
+            <p:ph type="title"/>
+          </p:nvPr>
+        </p:nvSpPr>
+        <p:spPr/>
+        <p:txBody>
+          <a:bodyPr/>
+          <a:lstStyle/>
+          <a:p>
+            <a:r>
+              <a:rPr lang="en-US" dirty="0" smtClean="0">
+                <a:solidFill>
+                  <a:srgbClr val="C00000"/>
+                </a:solidFill>
+              </a:rPr>
+              <a:t>Spoofing</a:t>
+            </a:r>
+            <a:r>
+              <a:rPr lang="ru-RU" dirty="0" smtClean="0"/>
+              <a:t> - </a:t>
+            </a:r>
+            <a:r>
+              <a:rPr lang="en-US" dirty="0" smtClean="0"/>
+              <a:t>authentication</a:t>
+            </a:r>
+            <a:endParaRPr lang="ru-RU" dirty="0"/>
+          </a:p>
+        </p:txBody>
+      </p:sp>
+      <p:sp>
+        <p:nvSpPr>
+          <p:cNvPr id="6" name="Content Placeholder 5"/>
+          <p:cNvSpPr>
+            <a:spLocks noGrp="1"/>
+          </p:cNvSpPr>
+          <p:nvPr>
+            <p:ph sz="quarter" idx="12"/>
+          </p:nvPr>
+        </p:nvSpPr>
+        <p:spPr/>
+        <p:txBody>
+          <a:bodyPr/>
+          <a:lstStyle/>
+          <a:p>
+            <a:pPr marL="0" indent="0" algn="ctr">
+              <a:buNone/>
+            </a:pPr>
+            <a:endParaRPr lang="ru-RU" sz="1800" dirty="0" smtClean="0"/>
+          </a:p>
+          <a:p>
+            <a:pPr marL="0" indent="0" algn="ctr">
+              <a:buNone/>
+            </a:pPr>
+            <a:endParaRPr lang="ru-RU" sz="1800" dirty="0" smtClean="0"/>
+          </a:p>
+          <a:p>
+            <a:pPr marL="0" indent="0" algn="ctr">
+              <a:buNone/>
+            </a:pPr>
+            <a:endParaRPr lang="ru-RU" sz="1800" dirty="0" smtClean="0"/>
+          </a:p>
+          <a:p>
+            <a:pPr marL="0" indent="0" algn="ctr">
+              <a:buNone/>
+            </a:pPr>
+            <a:r>
+              <a:rPr lang="ru-RU" sz="2800" dirty="0" smtClean="0"/>
+              <a:t>Процесс маскировки (подмены) пользователя или программы под другую</a:t>
+            </a:r>
+            <a:endParaRPr lang="ru-RU" sz="2800" dirty="0"/>
+          </a:p>
+        </p:txBody>
+      </p:sp>
+    </p:spTree>
+    <p:extLst>
+      <p:ext uri="{BB962C8B-B14F-4D97-AF65-F5344CB8AC3E}">
+        <p14:creationId xmlns:p14="http://schemas.microsoft.com/office/powerpoint/2010/main" val="4220539737"/>
+      </p:ext>
+    </p:extLst>
+  </p:cSld>
+  <p:clrMapOvr>
+    <a:masterClrMapping/>
+  </p:clrMapOvr>
+  <p:timing>
+    <p:tnLst>
+      <p:par>
+        <p:cTn id="1" dur="indefinite" restart="never" nodeType="tmRoot"/>
+      </p:par>
+    </p:tnLst>
+  </p:timing>
+</p:sld>
+</file>
+
+<file path=ppt/slides/slide8.xml><?xml version="1.0" encoding="utf-8"?>
+<p:sld xmlns:a="http://schemas.openxmlformats.org/drawingml/2006/main" xmlns:r="http://schemas.openxmlformats.org/officeDocument/2006/relationships" xmlns:p="http://schemas.openxmlformats.org/presentationml/2006/main">
+  <p:cSld>
+    <p:spTree>
+      <p:nvGrpSpPr>
+        <p:cNvPr id="1" name=""/>
+        <p:cNvGrpSpPr/>
+        <p:nvPr/>
+      </p:nvGrpSpPr>
+      <p:grpSpPr>
+        <a:xfrm>
+          <a:off x="0" y="0"/>
+          <a:ext cx="0" cy="0"/>
+          <a:chOff x="0" y="0"/>
+          <a:chExt cx="0" cy="0"/>
+        </a:xfrm>
+      </p:grpSpPr>
+      <p:sp>
+        <p:nvSpPr>
+          <p:cNvPr id="2" name="Заголовок 1"/>
+          <p:cNvSpPr>
+            <a:spLocks noGrp="1"/>
+          </p:cNvSpPr>
+          <p:nvPr>
+            <p:ph type="title"/>
+          </p:nvPr>
+        </p:nvSpPr>
+        <p:spPr/>
+        <p:txBody>
+          <a:bodyPr/>
+          <a:lstStyle/>
+          <a:p>
+            <a:r>
+              <a:rPr lang="en-US" dirty="0" smtClean="0">
+                <a:solidFill>
+                  <a:srgbClr val="C00000"/>
+                </a:solidFill>
+              </a:rPr>
+              <a:t>Tampering</a:t>
+            </a:r>
+            <a:r>
+              <a:rPr lang="en-US" dirty="0" smtClean="0"/>
+              <a:t> - integrity</a:t>
+            </a:r>
+            <a:endParaRPr lang="ru-RU" dirty="0"/>
+          </a:p>
+        </p:txBody>
+      </p:sp>
+      <p:sp>
+        <p:nvSpPr>
+          <p:cNvPr id="6" name="Content Placeholder 5"/>
+          <p:cNvSpPr>
+            <a:spLocks noGrp="1"/>
+          </p:cNvSpPr>
+          <p:nvPr>
+            <p:ph sz="quarter" idx="12"/>
+          </p:nvPr>
+        </p:nvSpPr>
+        <p:spPr/>
+        <p:txBody>
+          <a:bodyPr/>
+          <a:lstStyle/>
+          <a:p>
+            <a:pPr marL="0" indent="0" algn="ctr">
+              <a:buNone/>
+            </a:pPr>
+            <a:endParaRPr lang="ru-RU" sz="1800" dirty="0" smtClean="0"/>
+          </a:p>
+          <a:p>
+            <a:pPr marL="0" indent="0" algn="ctr">
+              <a:buNone/>
+            </a:pPr>
+            <a:endParaRPr lang="ru-RU" sz="1800" dirty="0" smtClean="0"/>
+          </a:p>
+          <a:p>
+            <a:pPr marL="0" indent="0" algn="ctr">
+              <a:buNone/>
+            </a:pPr>
+            <a:endParaRPr lang="ru-RU" sz="1800" dirty="0" smtClean="0"/>
+          </a:p>
+          <a:p>
+            <a:pPr marL="0" indent="0" algn="ctr">
+              <a:buNone/>
+            </a:pPr>
+            <a:r>
+              <a:rPr lang="ru-RU" sz="2800" dirty="0" smtClean="0"/>
+              <a:t>Несанкционированный процесс изменения (разрушения) данных или программы.</a:t>
+            </a:r>
+            <a:endParaRPr lang="ru-RU" sz="2800" dirty="0"/>
+          </a:p>
+        </p:txBody>
+      </p:sp>
+    </p:spTree>
+    <p:extLst>
+      <p:ext uri="{BB962C8B-B14F-4D97-AF65-F5344CB8AC3E}">
+        <p14:creationId xmlns:p14="http://schemas.microsoft.com/office/powerpoint/2010/main" val="3285988337"/>
+      </p:ext>
+    </p:extLst>
+  </p:cSld>
+  <p:clrMapOvr>
+    <a:masterClrMapping/>
+  </p:clrMapOvr>
+  <p:timing>
+    <p:tnLst>
+      <p:par>
+        <p:cTn id="1" dur="indefinite" restart="never" nodeType="tmRoot"/>
+      </p:par>
+    </p:tnLst>
+  </p:timing>
+</p:sld>
+</file>
+
 <file path=ppt/slides/slide9.xml><?xml version="1.0" encoding="utf-8"?>
 <p:sld xmlns:a="http://schemas.openxmlformats.org/drawingml/2006/main" xmlns:r="http://schemas.openxmlformats.org/officeDocument/2006/relationships" xmlns:p="http://schemas.openxmlformats.org/presentationml/2006/main">
   <p:cSld>
@@ -33785,15 +33289,11 @@
                   <a:srgbClr val="C00000"/>
                 </a:solidFill>
               </a:rPr>
-              <a:t>Spoofing</a:t>
-            </a:r>
-            <a:r>
-              <a:rPr lang="ru-RU" dirty="0" smtClean="0"/>
-              <a:t> - </a:t>
+              <a:t>Repudiation</a:t>
             </a:r>
             <a:r>
               <a:rPr lang="en-US" dirty="0" smtClean="0"/>
-              <a:t>authentication</a:t>
+              <a:t> – non-repudiation</a:t>
             </a:r>
             <a:endParaRPr lang="ru-RU" dirty="0"/>
           </a:p>
@@ -33837,7 +33337,7 @@
             </a:pPr>
             <a:r>
               <a:rPr lang="ru-RU" sz="2800" dirty="0" smtClean="0"/>
-              <a:t>Процесс маскировки (подмены) пользователя или программы под другую</a:t>
+              <a:t>Заметание следов (запутывание).</a:t>
             </a:r>
             <a:endParaRPr lang="ru-RU" sz="2800" dirty="0"/>
           </a:p>
@@ -33846,7 +33346,7 @@
     </p:spTree>
     <p:extLst>
       <p:ext uri="{BB962C8B-B14F-4D97-AF65-F5344CB8AC3E}">
-        <p14:creationId xmlns:p14="http://schemas.microsoft.com/office/powerpoint/2010/main" val="4220539737"/>
+        <p14:creationId xmlns:p14="http://schemas.microsoft.com/office/powerpoint/2010/main" val="2530193212"/>
       </p:ext>
     </p:extLst>
   </p:cSld>
@@ -35005,12 +34505,15 @@
 </file>
 
 <file path=customXml/item1.xml><?xml version="1.0" encoding="utf-8"?>
-<?mso-contentType ?>
-<FormTemplates xmlns="http://schemas.microsoft.com/sharepoint/v3/contenttype/forms">
-  <Display>DocumentLibraryForm</Display>
-  <Edit>DocumentLibraryForm</Edit>
-  <New>DocumentLibraryForm</New>
-</FormTemplates>
+<p:properties xmlns:p="http://schemas.microsoft.com/office/2006/metadata/properties" xmlns:xsi="http://www.w3.org/2001/XMLSchema-instance" xmlns:pc="http://schemas.microsoft.com/office/infopath/2007/PartnerControls">
+  <documentManagement>
+    <Preview xmlns="8a09c138-3bb3-4bc6-a8a7-2afac9fb1b96">https://intranet.kaspersky.com/PublishingImages/Brand_Central/16x9.jpg, </Preview>
+    <Link xmlns="8a09c138-3bb3-4bc6-a8a7-2afac9fb1b96">
+      <Url xsi:nil="true"/>
+      <Description xsi:nil="true"/>
+    </Link>
+  </documentManagement>
+</p:properties>
 </file>
 
 <file path=customXml/item2.xml><?xml version="1.0" encoding="utf-8"?>
@@ -35153,21 +34656,26 @@
 </file>
 
 <file path=customXml/item3.xml><?xml version="1.0" encoding="utf-8"?>
-<p:properties xmlns:p="http://schemas.microsoft.com/office/2006/metadata/properties" xmlns:xsi="http://www.w3.org/2001/XMLSchema-instance" xmlns:pc="http://schemas.microsoft.com/office/infopath/2007/PartnerControls">
-  <documentManagement>
-    <Preview xmlns="8a09c138-3bb3-4bc6-a8a7-2afac9fb1b96">https://intranet.kaspersky.com/PublishingImages/Brand_Central/16x9.jpg, </Preview>
-    <Link xmlns="8a09c138-3bb3-4bc6-a8a7-2afac9fb1b96">
-      <Url xsi:nil="true"/>
-      <Description xsi:nil="true"/>
-    </Link>
-  </documentManagement>
-</p:properties>
+<?mso-contentType ?>
+<FormTemplates xmlns="http://schemas.microsoft.com/sharepoint/v3/contenttype/forms">
+  <Display>DocumentLibraryForm</Display>
+  <Edit>DocumentLibraryForm</Edit>
+  <New>DocumentLibraryForm</New>
+</FormTemplates>
 </file>
 
 <file path=customXml/itemProps1.xml><?xml version="1.0" encoding="utf-8"?>
-<ds:datastoreItem xmlns:ds="http://schemas.openxmlformats.org/officeDocument/2006/customXml" ds:itemID="{A9684E87-8FA4-4297-8378-8D5D3320CC30}">
+<ds:datastoreItem xmlns:ds="http://schemas.openxmlformats.org/officeDocument/2006/customXml" ds:itemID="{3235EFE6-ED36-44A8-992E-657AFD707955}">
   <ds:schemaRefs>
-    <ds:schemaRef ds:uri="http://schemas.microsoft.com/sharepoint/v3/contenttype/forms"/>
+    <ds:schemaRef ds:uri="http://purl.org/dc/elements/1.1/"/>
+    <ds:schemaRef ds:uri="http://schemas.microsoft.com/office/2006/metadata/properties"/>
+    <ds:schemaRef ds:uri="http://schemas.openxmlformats.org/package/2006/metadata/core-properties"/>
+    <ds:schemaRef ds:uri="8a09c138-3bb3-4bc6-a8a7-2afac9fb1b96"/>
+    <ds:schemaRef ds:uri="http://schemas.microsoft.com/office/infopath/2007/PartnerControls"/>
+    <ds:schemaRef ds:uri="http://purl.org/dc/terms/"/>
+    <ds:schemaRef ds:uri="http://schemas.microsoft.com/office/2006/documentManagement/types"/>
+    <ds:schemaRef ds:uri="http://www.w3.org/XML/1998/namespace"/>
+    <ds:schemaRef ds:uri="http://purl.org/dc/dcmitype/"/>
   </ds:schemaRefs>
 </ds:datastoreItem>
 </file>
@@ -35191,17 +34699,9 @@
 </file>
 
 <file path=customXml/itemProps3.xml><?xml version="1.0" encoding="utf-8"?>
-<ds:datastoreItem xmlns:ds="http://schemas.openxmlformats.org/officeDocument/2006/customXml" ds:itemID="{3235EFE6-ED36-44A8-992E-657AFD707955}">
+<ds:datastoreItem xmlns:ds="http://schemas.openxmlformats.org/officeDocument/2006/customXml" ds:itemID="{A9684E87-8FA4-4297-8378-8D5D3320CC30}">
   <ds:schemaRefs>
-    <ds:schemaRef ds:uri="http://purl.org/dc/elements/1.1/"/>
-    <ds:schemaRef ds:uri="http://schemas.microsoft.com/office/2006/metadata/properties"/>
-    <ds:schemaRef ds:uri="http://schemas.openxmlformats.org/package/2006/metadata/core-properties"/>
-    <ds:schemaRef ds:uri="8a09c138-3bb3-4bc6-a8a7-2afac9fb1b96"/>
-    <ds:schemaRef ds:uri="http://schemas.microsoft.com/office/infopath/2007/PartnerControls"/>
-    <ds:schemaRef ds:uri="http://purl.org/dc/terms/"/>
-    <ds:schemaRef ds:uri="http://schemas.microsoft.com/office/2006/documentManagement/types"/>
-    <ds:schemaRef ds:uri="http://www.w3.org/XML/1998/namespace"/>
-    <ds:schemaRef ds:uri="http://purl.org/dc/dcmitype/"/>
+    <ds:schemaRef ds:uri="http://schemas.microsoft.com/sharepoint/v3/contenttype/forms"/>
   </ds:schemaRefs>
 </ds:datastoreItem>
 </file>
</xml_diff>